<commit_message>
Added Azure Migrate assessments and dependency visualization to HOL
</commit_message>
<xml_diff>
--- a/Hands-on lab/Images/image-source.pptx
+++ b/Hands-on lab/Images/image-source.pptx
@@ -5,7 +5,7 @@
     <p:sldMasterId id="2147483648" r:id="rId1"/>
   </p:sldMasterIdLst>
   <p:sldIdLst>
-    <p:sldId id="256" r:id="rId2"/>
+    <p:sldId id="257" r:id="rId2"/>
   </p:sldIdLst>
   <p:sldSz cx="12192000" cy="6858000"/>
   <p:notesSz cx="6858000" cy="9144000"/>
@@ -104,6 +104,11 @@
       </a:defRPr>
     </a:lvl9pPr>
   </p:defaultTextStyle>
+  <p:extLst>
+    <p:ext uri="{EFAFB233-063F-42B5-8137-9DF3F51BA10A}">
+      <p15:sldGuideLst xmlns:p15="http://schemas.microsoft.com/office/powerpoint/2012/main"/>
+    </p:ext>
+  </p:extLst>
 </p:presentation>
 </file>
 
@@ -256,7 +261,7 @@
           <a:p>
             <a:fld id="{9F1BFCDA-4DF7-4C82-AD84-C667DD7FA52D}" type="datetimeFigureOut">
               <a:rPr lang="en-IE" smtClean="0"/>
-              <a:t>04/04/2019</a:t>
+              <a:t>17/04/2019</a:t>
             </a:fld>
             <a:endParaRPr lang="en-IE"/>
           </a:p>
@@ -456,7 +461,7 @@
           <a:p>
             <a:fld id="{9F1BFCDA-4DF7-4C82-AD84-C667DD7FA52D}" type="datetimeFigureOut">
               <a:rPr lang="en-IE" smtClean="0"/>
-              <a:t>04/04/2019</a:t>
+              <a:t>17/04/2019</a:t>
             </a:fld>
             <a:endParaRPr lang="en-IE"/>
           </a:p>
@@ -666,7 +671,7 @@
           <a:p>
             <a:fld id="{9F1BFCDA-4DF7-4C82-AD84-C667DD7FA52D}" type="datetimeFigureOut">
               <a:rPr lang="en-IE" smtClean="0"/>
-              <a:t>04/04/2019</a:t>
+              <a:t>17/04/2019</a:t>
             </a:fld>
             <a:endParaRPr lang="en-IE"/>
           </a:p>
@@ -866,7 +871,7 @@
           <a:p>
             <a:fld id="{9F1BFCDA-4DF7-4C82-AD84-C667DD7FA52D}" type="datetimeFigureOut">
               <a:rPr lang="en-IE" smtClean="0"/>
-              <a:t>04/04/2019</a:t>
+              <a:t>17/04/2019</a:t>
             </a:fld>
             <a:endParaRPr lang="en-IE"/>
           </a:p>
@@ -1142,7 +1147,7 @@
           <a:p>
             <a:fld id="{9F1BFCDA-4DF7-4C82-AD84-C667DD7FA52D}" type="datetimeFigureOut">
               <a:rPr lang="en-IE" smtClean="0"/>
-              <a:t>04/04/2019</a:t>
+              <a:t>17/04/2019</a:t>
             </a:fld>
             <a:endParaRPr lang="en-IE"/>
           </a:p>
@@ -1410,7 +1415,7 @@
           <a:p>
             <a:fld id="{9F1BFCDA-4DF7-4C82-AD84-C667DD7FA52D}" type="datetimeFigureOut">
               <a:rPr lang="en-IE" smtClean="0"/>
-              <a:t>04/04/2019</a:t>
+              <a:t>17/04/2019</a:t>
             </a:fld>
             <a:endParaRPr lang="en-IE"/>
           </a:p>
@@ -1825,7 +1830,7 @@
           <a:p>
             <a:fld id="{9F1BFCDA-4DF7-4C82-AD84-C667DD7FA52D}" type="datetimeFigureOut">
               <a:rPr lang="en-IE" smtClean="0"/>
-              <a:t>04/04/2019</a:t>
+              <a:t>17/04/2019</a:t>
             </a:fld>
             <a:endParaRPr lang="en-IE"/>
           </a:p>
@@ -1967,7 +1972,7 @@
           <a:p>
             <a:fld id="{9F1BFCDA-4DF7-4C82-AD84-C667DD7FA52D}" type="datetimeFigureOut">
               <a:rPr lang="en-IE" smtClean="0"/>
-              <a:t>04/04/2019</a:t>
+              <a:t>17/04/2019</a:t>
             </a:fld>
             <a:endParaRPr lang="en-IE"/>
           </a:p>
@@ -2080,7 +2085,7 @@
           <a:p>
             <a:fld id="{9F1BFCDA-4DF7-4C82-AD84-C667DD7FA52D}" type="datetimeFigureOut">
               <a:rPr lang="en-IE" smtClean="0"/>
-              <a:t>04/04/2019</a:t>
+              <a:t>17/04/2019</a:t>
             </a:fld>
             <a:endParaRPr lang="en-IE"/>
           </a:p>
@@ -2393,7 +2398,7 @@
           <a:p>
             <a:fld id="{9F1BFCDA-4DF7-4C82-AD84-C667DD7FA52D}" type="datetimeFigureOut">
               <a:rPr lang="en-IE" smtClean="0"/>
-              <a:t>04/04/2019</a:t>
+              <a:t>17/04/2019</a:t>
             </a:fld>
             <a:endParaRPr lang="en-IE"/>
           </a:p>
@@ -2682,7 +2687,7 @@
           <a:p>
             <a:fld id="{9F1BFCDA-4DF7-4C82-AD84-C667DD7FA52D}" type="datetimeFigureOut">
               <a:rPr lang="en-IE" smtClean="0"/>
-              <a:t>04/04/2019</a:t>
+              <a:t>17/04/2019</a:t>
             </a:fld>
             <a:endParaRPr lang="en-IE"/>
           </a:p>
@@ -2925,7 +2930,7 @@
           <a:p>
             <a:fld id="{9F1BFCDA-4DF7-4C82-AD84-C667DD7FA52D}" type="datetimeFigureOut">
               <a:rPr lang="en-IE" smtClean="0"/>
-              <a:t>04/04/2019</a:t>
+              <a:t>17/04/2019</a:t>
             </a:fld>
             <a:endParaRPr lang="en-IE"/>
           </a:p>
@@ -3344,58 +3349,2130 @@
       </p:grpSpPr>
       <p:sp>
         <p:nvSpPr>
-          <p:cNvPr id="2" name="Title 1">
-            <a:extLst>
-              <a:ext uri="{FF2B5EF4-FFF2-40B4-BE49-F238E27FC236}">
-                <a16:creationId xmlns:a16="http://schemas.microsoft.com/office/drawing/2014/main" id="{B9038D8E-196C-4565-8567-5F404A92FCD8}"/>
-              </a:ext>
-            </a:extLst>
-          </p:cNvPr>
-          <p:cNvSpPr>
-            <a:spLocks noGrp="1"/>
-          </p:cNvSpPr>
-          <p:nvPr>
-            <p:ph type="ctrTitle"/>
-          </p:nvPr>
-        </p:nvSpPr>
-        <p:spPr/>
-        <p:txBody>
-          <a:bodyPr/>
-          <a:lstStyle/>
-          <a:p>
-            <a:endParaRPr lang="en-IE"/>
-          </a:p>
-        </p:txBody>
-      </p:sp>
-      <p:sp>
-        <p:nvSpPr>
-          <p:cNvPr id="3" name="Subtitle 2">
-            <a:extLst>
-              <a:ext uri="{FF2B5EF4-FFF2-40B4-BE49-F238E27FC236}">
-                <a16:creationId xmlns:a16="http://schemas.microsoft.com/office/drawing/2014/main" id="{BC91F33B-D092-4006-9F06-A5338422953D}"/>
-              </a:ext>
-            </a:extLst>
-          </p:cNvPr>
-          <p:cNvSpPr>
-            <a:spLocks noGrp="1"/>
-          </p:cNvSpPr>
-          <p:nvPr>
-            <p:ph type="subTitle" idx="1"/>
-          </p:nvPr>
-        </p:nvSpPr>
-        <p:spPr/>
-        <p:txBody>
-          <a:bodyPr/>
-          <a:lstStyle/>
-          <a:p>
-            <a:endParaRPr lang="en-IE"/>
-          </a:p>
-        </p:txBody>
-      </p:sp>
+          <p:cNvPr id="4" name="Rectangle 3">
+            <a:extLst>
+              <a:ext uri="{FF2B5EF4-FFF2-40B4-BE49-F238E27FC236}">
+                <a16:creationId xmlns:a16="http://schemas.microsoft.com/office/drawing/2014/main" id="{0DCB3653-9A82-47CF-BDC8-41D24ABFCBAF}"/>
+              </a:ext>
+            </a:extLst>
+          </p:cNvPr>
+          <p:cNvSpPr/>
+          <p:nvPr/>
+        </p:nvSpPr>
+        <p:spPr>
+          <a:xfrm>
+            <a:off x="1275285" y="1267449"/>
+            <a:ext cx="4288117" cy="5219403"/>
+          </a:xfrm>
+          <a:prstGeom prst="rect">
+            <a:avLst/>
+          </a:prstGeom>
+          <a:noFill/>
+          <a:ln>
+            <a:solidFill>
+              <a:schemeClr val="tx1"/>
+            </a:solidFill>
+            <a:prstDash val="dash"/>
+          </a:ln>
+        </p:spPr>
+        <p:style>
+          <a:lnRef idx="2">
+            <a:schemeClr val="accent1">
+              <a:shade val="50000"/>
+            </a:schemeClr>
+          </a:lnRef>
+          <a:fillRef idx="1">
+            <a:schemeClr val="accent1"/>
+          </a:fillRef>
+          <a:effectRef idx="0">
+            <a:schemeClr val="accent1"/>
+          </a:effectRef>
+          <a:fontRef idx="minor">
+            <a:schemeClr val="lt1"/>
+          </a:fontRef>
+        </p:style>
+        <p:txBody>
+          <a:bodyPr rtlCol="0" anchor="ctr"/>
+          <a:lstStyle/>
+          <a:p>
+            <a:pPr algn="ctr"/>
+            <a:endParaRPr lang="en-US"/>
+          </a:p>
+        </p:txBody>
+      </p:sp>
+      <p:sp>
+        <p:nvSpPr>
+          <p:cNvPr id="6" name="TextBox 5">
+            <a:extLst>
+              <a:ext uri="{FF2B5EF4-FFF2-40B4-BE49-F238E27FC236}">
+                <a16:creationId xmlns:a16="http://schemas.microsoft.com/office/drawing/2014/main" id="{53606825-A11D-48BD-9F0C-9376B419BC7B}"/>
+              </a:ext>
+            </a:extLst>
+          </p:cNvPr>
+          <p:cNvSpPr txBox="1"/>
+          <p:nvPr/>
+        </p:nvSpPr>
+        <p:spPr>
+          <a:xfrm>
+            <a:off x="253688" y="3991013"/>
+            <a:ext cx="979307" cy="461665"/>
+          </a:xfrm>
+          <a:prstGeom prst="rect">
+            <a:avLst/>
+          </a:prstGeom>
+          <a:noFill/>
+        </p:spPr>
+        <p:txBody>
+          <a:bodyPr wrap="none" rtlCol="0">
+            <a:spAutoFit/>
+          </a:bodyPr>
+          <a:lstStyle/>
+          <a:p>
+            <a:pPr algn="ctr"/>
+            <a:r>
+              <a:rPr lang="en-US" sz="1200" dirty="0" err="1"/>
+              <a:t>SmartHotel</a:t>
+            </a:r>
+            <a:br>
+              <a:rPr lang="en-US" sz="1200" dirty="0"/>
+            </a:br>
+            <a:r>
+              <a:rPr lang="en-US" sz="1200" dirty="0"/>
+              <a:t>On-premises</a:t>
+            </a:r>
+          </a:p>
+        </p:txBody>
+      </p:sp>
+      <p:grpSp>
+        <p:nvGrpSpPr>
+          <p:cNvPr id="15" name="Group 14">
+            <a:extLst>
+              <a:ext uri="{FF2B5EF4-FFF2-40B4-BE49-F238E27FC236}">
+                <a16:creationId xmlns:a16="http://schemas.microsoft.com/office/drawing/2014/main" id="{99DADC37-2BA0-4D68-9755-6FE71AF98E36}"/>
+              </a:ext>
+            </a:extLst>
+          </p:cNvPr>
+          <p:cNvGrpSpPr/>
+          <p:nvPr/>
+        </p:nvGrpSpPr>
+        <p:grpSpPr>
+          <a:xfrm>
+            <a:off x="1485881" y="3408875"/>
+            <a:ext cx="1184748" cy="1118512"/>
+            <a:chOff x="1426409" y="1920343"/>
+            <a:chExt cx="1184748" cy="1118512"/>
+          </a:xfrm>
+        </p:grpSpPr>
+        <p:pic>
+          <p:nvPicPr>
+            <p:cNvPr id="13" name="Picture 12" descr="A picture containing text, vector graphics&#10;&#10;Description generated with high confidence">
+              <a:extLst>
+                <a:ext uri="{FF2B5EF4-FFF2-40B4-BE49-F238E27FC236}">
+                  <a16:creationId xmlns:a16="http://schemas.microsoft.com/office/drawing/2014/main" id="{D4776D4F-5EEC-41BA-BEDC-9C665DA9C688}"/>
+                </a:ext>
+              </a:extLst>
+            </p:cNvPr>
+            <p:cNvPicPr>
+              <a:picLocks noChangeAspect="1"/>
+            </p:cNvPicPr>
+            <p:nvPr/>
+          </p:nvPicPr>
+          <p:blipFill>
+            <a:blip r:embed="rId2">
+              <a:extLst>
+                <a:ext uri="{28A0092B-C50C-407E-A947-70E740481C1C}">
+                  <a14:useLocalDpi xmlns:a14="http://schemas.microsoft.com/office/drawing/2010/main" val="0"/>
+                </a:ext>
+              </a:extLst>
+            </a:blip>
+            <a:stretch>
+              <a:fillRect/>
+            </a:stretch>
+          </p:blipFill>
+          <p:spPr>
+            <a:xfrm>
+              <a:off x="1628638" y="1920343"/>
+              <a:ext cx="780290" cy="780290"/>
+            </a:xfrm>
+            <a:prstGeom prst="rect">
+              <a:avLst/>
+            </a:prstGeom>
+          </p:spPr>
+        </p:pic>
+        <p:sp>
+          <p:nvSpPr>
+            <p:cNvPr id="14" name="TextBox 13">
+              <a:extLst>
+                <a:ext uri="{FF2B5EF4-FFF2-40B4-BE49-F238E27FC236}">
+                  <a16:creationId xmlns:a16="http://schemas.microsoft.com/office/drawing/2014/main" id="{5C9326FE-0A51-4FE2-A5AA-450477165E98}"/>
+                </a:ext>
+              </a:extLst>
+            </p:cNvPr>
+            <p:cNvSpPr txBox="1"/>
+            <p:nvPr/>
+          </p:nvSpPr>
+          <p:spPr>
+            <a:xfrm>
+              <a:off x="1426409" y="2761856"/>
+              <a:ext cx="1184748" cy="276999"/>
+            </a:xfrm>
+            <a:prstGeom prst="rect">
+              <a:avLst/>
+            </a:prstGeom>
+            <a:noFill/>
+          </p:spPr>
+          <p:txBody>
+            <a:bodyPr wrap="none" rtlCol="0">
+              <a:spAutoFit/>
+            </a:bodyPr>
+            <a:lstStyle/>
+            <a:p>
+              <a:r>
+                <a:rPr lang="en-US" sz="1200" dirty="0"/>
+                <a:t>SmartHotelHost</a:t>
+              </a:r>
+            </a:p>
+          </p:txBody>
+        </p:sp>
+      </p:grpSp>
+      <p:sp>
+        <p:nvSpPr>
+          <p:cNvPr id="16" name="TextBox 15">
+            <a:extLst>
+              <a:ext uri="{FF2B5EF4-FFF2-40B4-BE49-F238E27FC236}">
+                <a16:creationId xmlns:a16="http://schemas.microsoft.com/office/drawing/2014/main" id="{17C60843-DFA2-451A-AE4D-4DCD70CE2E39}"/>
+              </a:ext>
+            </a:extLst>
+          </p:cNvPr>
+          <p:cNvSpPr txBox="1"/>
+          <p:nvPr/>
+        </p:nvSpPr>
+        <p:spPr>
+          <a:xfrm>
+            <a:off x="3668768" y="3594036"/>
+            <a:ext cx="1262590" cy="276999"/>
+          </a:xfrm>
+          <a:prstGeom prst="rect">
+            <a:avLst/>
+          </a:prstGeom>
+          <a:noFill/>
+        </p:spPr>
+        <p:txBody>
+          <a:bodyPr wrap="none" rtlCol="0">
+            <a:spAutoFit/>
+          </a:bodyPr>
+          <a:lstStyle/>
+          <a:p>
+            <a:r>
+              <a:rPr lang="en-US" sz="1200" dirty="0"/>
+              <a:t>SmartHotelWeb1</a:t>
+            </a:r>
+          </a:p>
+        </p:txBody>
+      </p:sp>
+      <p:sp>
+        <p:nvSpPr>
+          <p:cNvPr id="20" name="TextBox 19">
+            <a:extLst>
+              <a:ext uri="{FF2B5EF4-FFF2-40B4-BE49-F238E27FC236}">
+                <a16:creationId xmlns:a16="http://schemas.microsoft.com/office/drawing/2014/main" id="{47087867-1824-45B8-A28A-71A08C09E975}"/>
+              </a:ext>
+            </a:extLst>
+          </p:cNvPr>
+          <p:cNvSpPr txBox="1"/>
+          <p:nvPr/>
+        </p:nvSpPr>
+        <p:spPr>
+          <a:xfrm>
+            <a:off x="3668768" y="4756438"/>
+            <a:ext cx="1262590" cy="276999"/>
+          </a:xfrm>
+          <a:prstGeom prst="rect">
+            <a:avLst/>
+          </a:prstGeom>
+          <a:noFill/>
+        </p:spPr>
+        <p:txBody>
+          <a:bodyPr wrap="none" rtlCol="0">
+            <a:spAutoFit/>
+          </a:bodyPr>
+          <a:lstStyle/>
+          <a:p>
+            <a:r>
+              <a:rPr lang="en-US" sz="1200" dirty="0"/>
+              <a:t>SmartHotelWeb2</a:t>
+            </a:r>
+          </a:p>
+        </p:txBody>
+      </p:sp>
+      <p:sp>
+        <p:nvSpPr>
+          <p:cNvPr id="23" name="TextBox 22">
+            <a:extLst>
+              <a:ext uri="{FF2B5EF4-FFF2-40B4-BE49-F238E27FC236}">
+                <a16:creationId xmlns:a16="http://schemas.microsoft.com/office/drawing/2014/main" id="{5F4121AC-B848-41F2-9EAB-5C5DEA187CFE}"/>
+              </a:ext>
+            </a:extLst>
+          </p:cNvPr>
+          <p:cNvSpPr txBox="1"/>
+          <p:nvPr/>
+        </p:nvSpPr>
+        <p:spPr>
+          <a:xfrm>
+            <a:off x="3668768" y="5935532"/>
+            <a:ext cx="1213730" cy="276999"/>
+          </a:xfrm>
+          <a:prstGeom prst="rect">
+            <a:avLst/>
+          </a:prstGeom>
+          <a:noFill/>
+        </p:spPr>
+        <p:txBody>
+          <a:bodyPr wrap="none" rtlCol="0">
+            <a:spAutoFit/>
+          </a:bodyPr>
+          <a:lstStyle/>
+          <a:p>
+            <a:r>
+              <a:rPr lang="en-US" sz="1200" dirty="0"/>
+              <a:t>SmartHotelSQL1</a:t>
+            </a:r>
+          </a:p>
+        </p:txBody>
+      </p:sp>
+      <p:pic>
+        <p:nvPicPr>
+          <p:cNvPr id="25" name="Picture 24" descr="A picture containing clipart&#10;&#10;Description generated with high confidence">
+            <a:extLst>
+              <a:ext uri="{FF2B5EF4-FFF2-40B4-BE49-F238E27FC236}">
+                <a16:creationId xmlns:a16="http://schemas.microsoft.com/office/drawing/2014/main" id="{DC494569-81FC-48C1-A2DD-8AB3FD7B00F1}"/>
+              </a:ext>
+            </a:extLst>
+          </p:cNvPr>
+          <p:cNvPicPr>
+            <a:picLocks noChangeAspect="1"/>
+          </p:cNvPicPr>
+          <p:nvPr/>
+        </p:nvPicPr>
+        <p:blipFill>
+          <a:blip r:embed="rId3">
+            <a:extLst>
+              <a:ext uri="{28A0092B-C50C-407E-A947-70E740481C1C}">
+                <a14:useLocalDpi xmlns:a14="http://schemas.microsoft.com/office/drawing/2010/main" val="0"/>
+              </a:ext>
+            </a:extLst>
+          </a:blip>
+          <a:stretch>
+            <a:fillRect/>
+          </a:stretch>
+        </p:blipFill>
+        <p:spPr>
+          <a:xfrm>
+            <a:off x="3992558" y="2797052"/>
+            <a:ext cx="780290" cy="780290"/>
+          </a:xfrm>
+          <a:prstGeom prst="rect">
+            <a:avLst/>
+          </a:prstGeom>
+        </p:spPr>
+      </p:pic>
+      <p:pic>
+        <p:nvPicPr>
+          <p:cNvPr id="27" name="Picture 26" descr="A picture containing clipart&#10;&#10;Description generated with high confidence">
+            <a:extLst>
+              <a:ext uri="{FF2B5EF4-FFF2-40B4-BE49-F238E27FC236}">
+                <a16:creationId xmlns:a16="http://schemas.microsoft.com/office/drawing/2014/main" id="{19048142-575E-434C-A785-1BBF61548129}"/>
+              </a:ext>
+            </a:extLst>
+          </p:cNvPr>
+          <p:cNvPicPr>
+            <a:picLocks noChangeAspect="1"/>
+          </p:cNvPicPr>
+          <p:nvPr/>
+        </p:nvPicPr>
+        <p:blipFill>
+          <a:blip r:embed="rId3">
+            <a:extLst>
+              <a:ext uri="{28A0092B-C50C-407E-A947-70E740481C1C}">
+                <a14:useLocalDpi xmlns:a14="http://schemas.microsoft.com/office/drawing/2010/main" val="0"/>
+              </a:ext>
+            </a:extLst>
+          </a:blip>
+          <a:stretch>
+            <a:fillRect/>
+          </a:stretch>
+        </p:blipFill>
+        <p:spPr>
+          <a:xfrm>
+            <a:off x="4011033" y="3923905"/>
+            <a:ext cx="780290" cy="780290"/>
+          </a:xfrm>
+          <a:prstGeom prst="rect">
+            <a:avLst/>
+          </a:prstGeom>
+        </p:spPr>
+      </p:pic>
+      <p:pic>
+        <p:nvPicPr>
+          <p:cNvPr id="29" name="Picture 28">
+            <a:extLst>
+              <a:ext uri="{FF2B5EF4-FFF2-40B4-BE49-F238E27FC236}">
+                <a16:creationId xmlns:a16="http://schemas.microsoft.com/office/drawing/2014/main" id="{81A1D8C6-7136-47EC-9465-946046F76FBD}"/>
+              </a:ext>
+            </a:extLst>
+          </p:cNvPr>
+          <p:cNvPicPr>
+            <a:picLocks noChangeAspect="1"/>
+          </p:cNvPicPr>
+          <p:nvPr/>
+        </p:nvPicPr>
+        <p:blipFill>
+          <a:blip r:embed="rId4">
+            <a:extLst>
+              <a:ext uri="{28A0092B-C50C-407E-A947-70E740481C1C}">
+                <a14:useLocalDpi xmlns:a14="http://schemas.microsoft.com/office/drawing/2010/main" val="0"/>
+              </a:ext>
+            </a:extLst>
+          </a:blip>
+          <a:stretch>
+            <a:fillRect/>
+          </a:stretch>
+        </p:blipFill>
+        <p:spPr>
+          <a:xfrm>
+            <a:off x="4011033" y="5094339"/>
+            <a:ext cx="780290" cy="780290"/>
+          </a:xfrm>
+          <a:prstGeom prst="rect">
+            <a:avLst/>
+          </a:prstGeom>
+        </p:spPr>
+      </p:pic>
+      <p:sp>
+        <p:nvSpPr>
+          <p:cNvPr id="30" name="Rectangle 29">
+            <a:extLst>
+              <a:ext uri="{FF2B5EF4-FFF2-40B4-BE49-F238E27FC236}">
+                <a16:creationId xmlns:a16="http://schemas.microsoft.com/office/drawing/2014/main" id="{8B7279D8-B91C-4EBD-9CA0-DCFCD07BFDB4}"/>
+              </a:ext>
+            </a:extLst>
+          </p:cNvPr>
+          <p:cNvSpPr/>
+          <p:nvPr/>
+        </p:nvSpPr>
+        <p:spPr>
+          <a:xfrm>
+            <a:off x="3287962" y="1390695"/>
+            <a:ext cx="2070981" cy="4902164"/>
+          </a:xfrm>
+          <a:prstGeom prst="rect">
+            <a:avLst/>
+          </a:prstGeom>
+          <a:noFill/>
+          <a:ln>
+            <a:solidFill>
+              <a:schemeClr val="tx1"/>
+            </a:solidFill>
+            <a:prstDash val="dash"/>
+          </a:ln>
+        </p:spPr>
+        <p:style>
+          <a:lnRef idx="2">
+            <a:schemeClr val="accent1">
+              <a:shade val="50000"/>
+            </a:schemeClr>
+          </a:lnRef>
+          <a:fillRef idx="1">
+            <a:schemeClr val="accent1"/>
+          </a:fillRef>
+          <a:effectRef idx="0">
+            <a:schemeClr val="accent1"/>
+          </a:effectRef>
+          <a:fontRef idx="minor">
+            <a:schemeClr val="lt1"/>
+          </a:fontRef>
+        </p:style>
+        <p:txBody>
+          <a:bodyPr rtlCol="0" anchor="ctr"/>
+          <a:lstStyle/>
+          <a:p>
+            <a:pPr algn="ctr"/>
+            <a:endParaRPr lang="en-US"/>
+          </a:p>
+        </p:txBody>
+      </p:sp>
+      <p:cxnSp>
+        <p:nvCxnSpPr>
+          <p:cNvPr id="32" name="Straight Connector 31">
+            <a:extLst>
+              <a:ext uri="{FF2B5EF4-FFF2-40B4-BE49-F238E27FC236}">
+                <a16:creationId xmlns:a16="http://schemas.microsoft.com/office/drawing/2014/main" id="{16477264-A9C4-4A33-B548-E128A2F17AE8}"/>
+              </a:ext>
+            </a:extLst>
+          </p:cNvPr>
+          <p:cNvCxnSpPr>
+            <a:cxnSpLocks/>
+            <a:stCxn id="13" idx="3"/>
+          </p:cNvCxnSpPr>
+          <p:nvPr/>
+        </p:nvCxnSpPr>
+        <p:spPr>
+          <a:xfrm flipV="1">
+            <a:off x="2468400" y="1390696"/>
+            <a:ext cx="819562" cy="2408324"/>
+          </a:xfrm>
+          <a:prstGeom prst="line">
+            <a:avLst/>
+          </a:prstGeom>
+        </p:spPr>
+        <p:style>
+          <a:lnRef idx="1">
+            <a:schemeClr val="accent1"/>
+          </a:lnRef>
+          <a:fillRef idx="0">
+            <a:schemeClr val="accent1"/>
+          </a:fillRef>
+          <a:effectRef idx="0">
+            <a:schemeClr val="accent1"/>
+          </a:effectRef>
+          <a:fontRef idx="minor">
+            <a:schemeClr val="tx1"/>
+          </a:fontRef>
+        </p:style>
+      </p:cxnSp>
+      <p:cxnSp>
+        <p:nvCxnSpPr>
+          <p:cNvPr id="33" name="Straight Connector 32">
+            <a:extLst>
+              <a:ext uri="{FF2B5EF4-FFF2-40B4-BE49-F238E27FC236}">
+                <a16:creationId xmlns:a16="http://schemas.microsoft.com/office/drawing/2014/main" id="{F3423CD6-4BB1-4B08-9FA6-EC0985D0670C}"/>
+              </a:ext>
+            </a:extLst>
+          </p:cNvPr>
+          <p:cNvCxnSpPr>
+            <a:cxnSpLocks/>
+            <a:stCxn id="13" idx="3"/>
+          </p:cNvCxnSpPr>
+          <p:nvPr/>
+        </p:nvCxnSpPr>
+        <p:spPr>
+          <a:xfrm>
+            <a:off x="2468400" y="3799020"/>
+            <a:ext cx="807345" cy="2493839"/>
+          </a:xfrm>
+          <a:prstGeom prst="line">
+            <a:avLst/>
+          </a:prstGeom>
+        </p:spPr>
+        <p:style>
+          <a:lnRef idx="1">
+            <a:schemeClr val="accent1"/>
+          </a:lnRef>
+          <a:fillRef idx="0">
+            <a:schemeClr val="accent1"/>
+          </a:fillRef>
+          <a:effectRef idx="0">
+            <a:schemeClr val="accent1"/>
+          </a:effectRef>
+          <a:fontRef idx="minor">
+            <a:schemeClr val="tx1"/>
+          </a:fontRef>
+        </p:style>
+      </p:cxnSp>
+      <p:sp>
+        <p:nvSpPr>
+          <p:cNvPr id="5" name="Rectangle 4">
+            <a:extLst>
+              <a:ext uri="{FF2B5EF4-FFF2-40B4-BE49-F238E27FC236}">
+                <a16:creationId xmlns:a16="http://schemas.microsoft.com/office/drawing/2014/main" id="{717CBFC2-269A-404D-8A3B-39D2669CC589}"/>
+              </a:ext>
+            </a:extLst>
+          </p:cNvPr>
+          <p:cNvSpPr/>
+          <p:nvPr/>
+        </p:nvSpPr>
+        <p:spPr>
+          <a:xfrm>
+            <a:off x="6700363" y="320916"/>
+            <a:ext cx="1995520" cy="6354321"/>
+          </a:xfrm>
+          <a:prstGeom prst="rect">
+            <a:avLst/>
+          </a:prstGeom>
+          <a:noFill/>
+          <a:ln>
+            <a:solidFill>
+              <a:schemeClr val="tx1"/>
+            </a:solidFill>
+            <a:prstDash val="dash"/>
+          </a:ln>
+        </p:spPr>
+        <p:style>
+          <a:lnRef idx="2">
+            <a:schemeClr val="accent1">
+              <a:shade val="50000"/>
+            </a:schemeClr>
+          </a:lnRef>
+          <a:fillRef idx="1">
+            <a:schemeClr val="accent1"/>
+          </a:fillRef>
+          <a:effectRef idx="0">
+            <a:schemeClr val="accent1"/>
+          </a:effectRef>
+          <a:fontRef idx="minor">
+            <a:schemeClr val="lt1"/>
+          </a:fontRef>
+        </p:style>
+        <p:txBody>
+          <a:bodyPr rtlCol="0" anchor="ctr"/>
+          <a:lstStyle/>
+          <a:p>
+            <a:pPr algn="ctr"/>
+            <a:endParaRPr lang="en-US"/>
+          </a:p>
+        </p:txBody>
+      </p:sp>
+      <p:sp>
+        <p:nvSpPr>
+          <p:cNvPr id="7" name="TextBox 6">
+            <a:extLst>
+              <a:ext uri="{FF2B5EF4-FFF2-40B4-BE49-F238E27FC236}">
+                <a16:creationId xmlns:a16="http://schemas.microsoft.com/office/drawing/2014/main" id="{C021C007-0C64-4FD4-B1FB-4EA09CB3A4D1}"/>
+              </a:ext>
+            </a:extLst>
+          </p:cNvPr>
+          <p:cNvSpPr txBox="1"/>
+          <p:nvPr/>
+        </p:nvSpPr>
+        <p:spPr>
+          <a:xfrm>
+            <a:off x="8745599" y="3991013"/>
+            <a:ext cx="896336" cy="461665"/>
+          </a:xfrm>
+          <a:prstGeom prst="rect">
+            <a:avLst/>
+          </a:prstGeom>
+          <a:noFill/>
+        </p:spPr>
+        <p:txBody>
+          <a:bodyPr wrap="none" rtlCol="0">
+            <a:spAutoFit/>
+          </a:bodyPr>
+          <a:lstStyle/>
+          <a:p>
+            <a:pPr algn="ctr"/>
+            <a:r>
+              <a:rPr lang="en-US" sz="1200" dirty="0" err="1"/>
+              <a:t>SmartHotel</a:t>
+            </a:r>
+            <a:br>
+              <a:rPr lang="en-US" sz="1200" dirty="0"/>
+            </a:br>
+            <a:r>
+              <a:rPr lang="en-US" sz="1200" dirty="0"/>
+              <a:t>Azure</a:t>
+            </a:r>
+          </a:p>
+        </p:txBody>
+      </p:sp>
+      <p:sp>
+        <p:nvSpPr>
+          <p:cNvPr id="39" name="TextBox 38">
+            <a:extLst>
+              <a:ext uri="{FF2B5EF4-FFF2-40B4-BE49-F238E27FC236}">
+                <a16:creationId xmlns:a16="http://schemas.microsoft.com/office/drawing/2014/main" id="{3677359E-8337-4789-8207-503955CE9E89}"/>
+              </a:ext>
+            </a:extLst>
+          </p:cNvPr>
+          <p:cNvSpPr txBox="1"/>
+          <p:nvPr/>
+        </p:nvSpPr>
+        <p:spPr>
+          <a:xfrm>
+            <a:off x="7098565" y="3891265"/>
+            <a:ext cx="1262590" cy="276999"/>
+          </a:xfrm>
+          <a:prstGeom prst="rect">
+            <a:avLst/>
+          </a:prstGeom>
+          <a:noFill/>
+        </p:spPr>
+        <p:txBody>
+          <a:bodyPr wrap="none" rtlCol="0">
+            <a:spAutoFit/>
+          </a:bodyPr>
+          <a:lstStyle/>
+          <a:p>
+            <a:r>
+              <a:rPr lang="en-US" sz="1200" dirty="0"/>
+              <a:t>SmartHotelWeb1</a:t>
+            </a:r>
+          </a:p>
+        </p:txBody>
+      </p:sp>
+      <p:sp>
+        <p:nvSpPr>
+          <p:cNvPr id="41" name="TextBox 40">
+            <a:extLst>
+              <a:ext uri="{FF2B5EF4-FFF2-40B4-BE49-F238E27FC236}">
+                <a16:creationId xmlns:a16="http://schemas.microsoft.com/office/drawing/2014/main" id="{EE0F77A1-AB83-431E-95A4-D7BA58FC767C}"/>
+              </a:ext>
+            </a:extLst>
+          </p:cNvPr>
+          <p:cNvSpPr txBox="1"/>
+          <p:nvPr/>
+        </p:nvSpPr>
+        <p:spPr>
+          <a:xfrm>
+            <a:off x="7098565" y="4955464"/>
+            <a:ext cx="1262590" cy="276999"/>
+          </a:xfrm>
+          <a:prstGeom prst="rect">
+            <a:avLst/>
+          </a:prstGeom>
+          <a:noFill/>
+        </p:spPr>
+        <p:txBody>
+          <a:bodyPr wrap="none" rtlCol="0">
+            <a:spAutoFit/>
+          </a:bodyPr>
+          <a:lstStyle/>
+          <a:p>
+            <a:r>
+              <a:rPr lang="en-US" sz="1200" dirty="0"/>
+              <a:t>SmartHotelWeb2</a:t>
+            </a:r>
+          </a:p>
+        </p:txBody>
+      </p:sp>
+      <p:pic>
+        <p:nvPicPr>
+          <p:cNvPr id="43" name="Picture 42" descr="A close up of a sign&#10;&#10;Description generated with high confidence">
+            <a:extLst>
+              <a:ext uri="{FF2B5EF4-FFF2-40B4-BE49-F238E27FC236}">
+                <a16:creationId xmlns:a16="http://schemas.microsoft.com/office/drawing/2014/main" id="{BC41755C-A7C3-4F83-B7F4-D12398947160}"/>
+              </a:ext>
+            </a:extLst>
+          </p:cNvPr>
+          <p:cNvPicPr>
+            <a:picLocks noChangeAspect="1"/>
+          </p:cNvPicPr>
+          <p:nvPr/>
+        </p:nvPicPr>
+        <p:blipFill>
+          <a:blip r:embed="rId5">
+            <a:extLst>
+              <a:ext uri="{28A0092B-C50C-407E-A947-70E740481C1C}">
+                <a14:useLocalDpi xmlns:a14="http://schemas.microsoft.com/office/drawing/2010/main" val="0"/>
+              </a:ext>
+            </a:extLst>
+          </a:blip>
+          <a:stretch>
+            <a:fillRect/>
+          </a:stretch>
+        </p:blipFill>
+        <p:spPr>
+          <a:xfrm>
+            <a:off x="7326145" y="5472827"/>
+            <a:ext cx="678983" cy="678983"/>
+          </a:xfrm>
+          <a:prstGeom prst="rect">
+            <a:avLst/>
+          </a:prstGeom>
+        </p:spPr>
+      </p:pic>
+      <p:sp>
+        <p:nvSpPr>
+          <p:cNvPr id="44" name="Rectangle 43">
+            <a:extLst>
+              <a:ext uri="{FF2B5EF4-FFF2-40B4-BE49-F238E27FC236}">
+                <a16:creationId xmlns:a16="http://schemas.microsoft.com/office/drawing/2014/main" id="{4E93C826-28E5-4E40-A9DA-3727F7C244BB}"/>
+              </a:ext>
+            </a:extLst>
+          </p:cNvPr>
+          <p:cNvSpPr/>
+          <p:nvPr/>
+        </p:nvSpPr>
+        <p:spPr>
+          <a:xfrm>
+            <a:off x="6846321" y="1767250"/>
+            <a:ext cx="1641490" cy="3465213"/>
+          </a:xfrm>
+          <a:prstGeom prst="rect">
+            <a:avLst/>
+          </a:prstGeom>
+          <a:noFill/>
+          <a:ln>
+            <a:solidFill>
+              <a:schemeClr val="tx1"/>
+            </a:solidFill>
+            <a:prstDash val="dash"/>
+          </a:ln>
+        </p:spPr>
+        <p:style>
+          <a:lnRef idx="2">
+            <a:schemeClr val="accent1">
+              <a:shade val="50000"/>
+            </a:schemeClr>
+          </a:lnRef>
+          <a:fillRef idx="1">
+            <a:schemeClr val="accent1"/>
+          </a:fillRef>
+          <a:effectRef idx="0">
+            <a:schemeClr val="accent1"/>
+          </a:effectRef>
+          <a:fontRef idx="minor">
+            <a:schemeClr val="lt1"/>
+          </a:fontRef>
+        </p:style>
+        <p:txBody>
+          <a:bodyPr rtlCol="0" anchor="ctr"/>
+          <a:lstStyle/>
+          <a:p>
+            <a:pPr algn="ctr"/>
+            <a:endParaRPr lang="en-US"/>
+          </a:p>
+        </p:txBody>
+      </p:sp>
+      <p:sp>
+        <p:nvSpPr>
+          <p:cNvPr id="45" name="Rectangle 44">
+            <a:extLst>
+              <a:ext uri="{FF2B5EF4-FFF2-40B4-BE49-F238E27FC236}">
+                <a16:creationId xmlns:a16="http://schemas.microsoft.com/office/drawing/2014/main" id="{41B1A3C6-3ED0-4059-85A1-BBF769B9D6ED}"/>
+              </a:ext>
+            </a:extLst>
+          </p:cNvPr>
+          <p:cNvSpPr/>
+          <p:nvPr/>
+        </p:nvSpPr>
+        <p:spPr>
+          <a:xfrm>
+            <a:off x="6860371" y="5377314"/>
+            <a:ext cx="1627439" cy="1211295"/>
+          </a:xfrm>
+          <a:prstGeom prst="rect">
+            <a:avLst/>
+          </a:prstGeom>
+          <a:noFill/>
+          <a:ln>
+            <a:solidFill>
+              <a:schemeClr val="tx1"/>
+            </a:solidFill>
+            <a:prstDash val="dash"/>
+          </a:ln>
+        </p:spPr>
+        <p:style>
+          <a:lnRef idx="2">
+            <a:schemeClr val="accent1">
+              <a:shade val="50000"/>
+            </a:schemeClr>
+          </a:lnRef>
+          <a:fillRef idx="1">
+            <a:schemeClr val="accent1"/>
+          </a:fillRef>
+          <a:effectRef idx="0">
+            <a:schemeClr val="accent1"/>
+          </a:effectRef>
+          <a:fontRef idx="minor">
+            <a:schemeClr val="lt1"/>
+          </a:fontRef>
+        </p:style>
+        <p:txBody>
+          <a:bodyPr rtlCol="0" anchor="ctr"/>
+          <a:lstStyle/>
+          <a:p>
+            <a:pPr algn="ctr"/>
+            <a:endParaRPr lang="en-US"/>
+          </a:p>
+        </p:txBody>
+      </p:sp>
+      <p:sp>
+        <p:nvSpPr>
+          <p:cNvPr id="46" name="TextBox 45">
+            <a:extLst>
+              <a:ext uri="{FF2B5EF4-FFF2-40B4-BE49-F238E27FC236}">
+                <a16:creationId xmlns:a16="http://schemas.microsoft.com/office/drawing/2014/main" id="{7CCC8428-0A2F-4685-A13B-2D5F63D4934D}"/>
+              </a:ext>
+            </a:extLst>
+          </p:cNvPr>
+          <p:cNvSpPr txBox="1"/>
+          <p:nvPr/>
+        </p:nvSpPr>
+        <p:spPr>
+          <a:xfrm>
+            <a:off x="7128502" y="6206464"/>
+            <a:ext cx="1074268" cy="276999"/>
+          </a:xfrm>
+          <a:prstGeom prst="rect">
+            <a:avLst/>
+          </a:prstGeom>
+          <a:noFill/>
+        </p:spPr>
+        <p:txBody>
+          <a:bodyPr wrap="none" rtlCol="0">
+            <a:spAutoFit/>
+          </a:bodyPr>
+          <a:lstStyle/>
+          <a:p>
+            <a:r>
+              <a:rPr lang="en-US" sz="1200" dirty="0" err="1"/>
+              <a:t>SmartHotelDB</a:t>
+            </a:r>
+            <a:endParaRPr lang="en-US" sz="1200" dirty="0"/>
+          </a:p>
+        </p:txBody>
+      </p:sp>
+      <p:sp>
+        <p:nvSpPr>
+          <p:cNvPr id="56" name="Arrow: Right 55">
+            <a:extLst>
+              <a:ext uri="{FF2B5EF4-FFF2-40B4-BE49-F238E27FC236}">
+                <a16:creationId xmlns:a16="http://schemas.microsoft.com/office/drawing/2014/main" id="{755E29BD-0406-4DFB-A7FF-6700177C9465}"/>
+              </a:ext>
+            </a:extLst>
+          </p:cNvPr>
+          <p:cNvSpPr/>
+          <p:nvPr/>
+        </p:nvSpPr>
+        <p:spPr>
+          <a:xfrm>
+            <a:off x="5300639" y="2942404"/>
+            <a:ext cx="1611067" cy="780290"/>
+          </a:xfrm>
+          <a:prstGeom prst="rightArrow">
+            <a:avLst/>
+          </a:prstGeom>
+        </p:spPr>
+        <p:style>
+          <a:lnRef idx="2">
+            <a:schemeClr val="accent1">
+              <a:shade val="50000"/>
+            </a:schemeClr>
+          </a:lnRef>
+          <a:fillRef idx="1">
+            <a:schemeClr val="accent1"/>
+          </a:fillRef>
+          <a:effectRef idx="0">
+            <a:schemeClr val="accent1"/>
+          </a:effectRef>
+          <a:fontRef idx="minor">
+            <a:schemeClr val="lt1"/>
+          </a:fontRef>
+        </p:style>
+        <p:txBody>
+          <a:bodyPr rtlCol="0" anchor="ctr"/>
+          <a:lstStyle/>
+          <a:p>
+            <a:pPr algn="ctr"/>
+            <a:endParaRPr lang="en-US"/>
+          </a:p>
+        </p:txBody>
+      </p:sp>
+      <p:pic>
+        <p:nvPicPr>
+          <p:cNvPr id="34" name="Picture 33" descr="A picture containing clipart&#10;&#10;Description generated with high confidence">
+            <a:extLst>
+              <a:ext uri="{FF2B5EF4-FFF2-40B4-BE49-F238E27FC236}">
+                <a16:creationId xmlns:a16="http://schemas.microsoft.com/office/drawing/2014/main" id="{8ADEEE9D-2388-4E08-ADAD-D46D9279698A}"/>
+              </a:ext>
+            </a:extLst>
+          </p:cNvPr>
+          <p:cNvPicPr>
+            <a:picLocks noChangeAspect="1"/>
+          </p:cNvPicPr>
+          <p:nvPr/>
+        </p:nvPicPr>
+        <p:blipFill>
+          <a:blip r:embed="rId3">
+            <a:extLst>
+              <a:ext uri="{28A0092B-C50C-407E-A947-70E740481C1C}">
+                <a14:useLocalDpi xmlns:a14="http://schemas.microsoft.com/office/drawing/2010/main" val="0"/>
+              </a:ext>
+            </a:extLst>
+          </a:blip>
+          <a:stretch>
+            <a:fillRect/>
+          </a:stretch>
+        </p:blipFill>
+        <p:spPr>
+          <a:xfrm>
+            <a:off x="3992558" y="1565715"/>
+            <a:ext cx="780290" cy="780290"/>
+          </a:xfrm>
+          <a:prstGeom prst="rect">
+            <a:avLst/>
+          </a:prstGeom>
+        </p:spPr>
+      </p:pic>
+      <p:sp>
+        <p:nvSpPr>
+          <p:cNvPr id="35" name="TextBox 34">
+            <a:extLst>
+              <a:ext uri="{FF2B5EF4-FFF2-40B4-BE49-F238E27FC236}">
+                <a16:creationId xmlns:a16="http://schemas.microsoft.com/office/drawing/2014/main" id="{09D30C7E-2ADC-4F47-BBF2-C035BCA0A524}"/>
+              </a:ext>
+            </a:extLst>
+          </p:cNvPr>
+          <p:cNvSpPr txBox="1"/>
+          <p:nvPr/>
+        </p:nvSpPr>
+        <p:spPr>
+          <a:xfrm>
+            <a:off x="3851399" y="2353234"/>
+            <a:ext cx="944105" cy="276999"/>
+          </a:xfrm>
+          <a:prstGeom prst="rect">
+            <a:avLst/>
+          </a:prstGeom>
+          <a:noFill/>
+        </p:spPr>
+        <p:txBody>
+          <a:bodyPr wrap="none" rtlCol="0">
+            <a:spAutoFit/>
+          </a:bodyPr>
+          <a:lstStyle/>
+          <a:p>
+            <a:r>
+              <a:rPr lang="en-US" sz="1200" dirty="0" err="1"/>
+              <a:t>UbuntuWAF</a:t>
+            </a:r>
+            <a:endParaRPr lang="en-US" sz="1200" dirty="0"/>
+          </a:p>
+        </p:txBody>
+      </p:sp>
+      <p:pic>
+        <p:nvPicPr>
+          <p:cNvPr id="3" name="Picture 2">
+            <a:extLst>
+              <a:ext uri="{FF2B5EF4-FFF2-40B4-BE49-F238E27FC236}">
+                <a16:creationId xmlns:a16="http://schemas.microsoft.com/office/drawing/2014/main" id="{00E476A0-C93F-40B2-88B4-BB8CA24AD234}"/>
+              </a:ext>
+            </a:extLst>
+          </p:cNvPr>
+          <p:cNvPicPr>
+            <a:picLocks noChangeAspect="1"/>
+          </p:cNvPicPr>
+          <p:nvPr/>
+        </p:nvPicPr>
+        <p:blipFill>
+          <a:blip r:embed="rId6">
+            <a:extLst>
+              <a:ext uri="{28A0092B-C50C-407E-A947-70E740481C1C}">
+                <a14:useLocalDpi xmlns:a14="http://schemas.microsoft.com/office/drawing/2010/main" val="0"/>
+              </a:ext>
+            </a:extLst>
+          </a:blip>
+          <a:stretch>
+            <a:fillRect/>
+          </a:stretch>
+        </p:blipFill>
+        <p:spPr>
+          <a:xfrm>
+            <a:off x="3668768" y="1934974"/>
+            <a:ext cx="390147" cy="390147"/>
+          </a:xfrm>
+          <a:prstGeom prst="rect">
+            <a:avLst/>
+          </a:prstGeom>
+        </p:spPr>
+      </p:pic>
+      <p:pic>
+        <p:nvPicPr>
+          <p:cNvPr id="11" name="Graphic 10">
+            <a:extLst>
+              <a:ext uri="{FF2B5EF4-FFF2-40B4-BE49-F238E27FC236}">
+                <a16:creationId xmlns:a16="http://schemas.microsoft.com/office/drawing/2014/main" id="{E967E7DA-ED81-4A9E-91DF-5B8055A00413}"/>
+              </a:ext>
+            </a:extLst>
+          </p:cNvPr>
+          <p:cNvPicPr>
+            <a:picLocks noChangeAspect="1"/>
+          </p:cNvPicPr>
+          <p:nvPr/>
+        </p:nvPicPr>
+        <p:blipFill>
+          <a:blip r:embed="rId7">
+            <a:extLst>
+              <a:ext uri="{28A0092B-C50C-407E-A947-70E740481C1C}">
+                <a14:useLocalDpi xmlns:a14="http://schemas.microsoft.com/office/drawing/2010/main" val="0"/>
+              </a:ext>
+              <a:ext uri="{96DAC541-7B7A-43D3-8B79-37D633B846F1}">
+                <asvg:svgBlip xmlns:asvg="http://schemas.microsoft.com/office/drawing/2016/SVG/main" r:embed="rId8"/>
+              </a:ext>
+            </a:extLst>
+          </a:blip>
+          <a:stretch>
+            <a:fillRect/>
+          </a:stretch>
+        </p:blipFill>
+        <p:spPr>
+          <a:xfrm>
+            <a:off x="7288380" y="1910999"/>
+            <a:ext cx="780290" cy="780290"/>
+          </a:xfrm>
+          <a:prstGeom prst="rect">
+            <a:avLst/>
+          </a:prstGeom>
+        </p:spPr>
+      </p:pic>
+      <p:pic>
+        <p:nvPicPr>
+          <p:cNvPr id="50" name="Graphic 49">
+            <a:extLst>
+              <a:ext uri="{FF2B5EF4-FFF2-40B4-BE49-F238E27FC236}">
+                <a16:creationId xmlns:a16="http://schemas.microsoft.com/office/drawing/2014/main" id="{482BF0A4-BC66-4537-8813-AC9CA1D7F2A3}"/>
+              </a:ext>
+            </a:extLst>
+          </p:cNvPr>
+          <p:cNvPicPr>
+            <a:picLocks noChangeAspect="1"/>
+          </p:cNvPicPr>
+          <p:nvPr/>
+        </p:nvPicPr>
+        <p:blipFill>
+          <a:blip r:embed="rId7">
+            <a:extLst>
+              <a:ext uri="{28A0092B-C50C-407E-A947-70E740481C1C}">
+                <a14:useLocalDpi xmlns:a14="http://schemas.microsoft.com/office/drawing/2010/main" val="0"/>
+              </a:ext>
+              <a:ext uri="{96DAC541-7B7A-43D3-8B79-37D633B846F1}">
+                <asvg:svgBlip xmlns:asvg="http://schemas.microsoft.com/office/drawing/2016/SVG/main" r:embed="rId8"/>
+              </a:ext>
+            </a:extLst>
+          </a:blip>
+          <a:stretch>
+            <a:fillRect/>
+          </a:stretch>
+        </p:blipFill>
+        <p:spPr>
+          <a:xfrm>
+            <a:off x="7305506" y="3075922"/>
+            <a:ext cx="780290" cy="780290"/>
+          </a:xfrm>
+          <a:prstGeom prst="rect">
+            <a:avLst/>
+          </a:prstGeom>
+        </p:spPr>
+      </p:pic>
+      <p:pic>
+        <p:nvPicPr>
+          <p:cNvPr id="57" name="Graphic 56">
+            <a:extLst>
+              <a:ext uri="{FF2B5EF4-FFF2-40B4-BE49-F238E27FC236}">
+                <a16:creationId xmlns:a16="http://schemas.microsoft.com/office/drawing/2014/main" id="{35049E8A-D75F-4C30-ADE1-6CD172A36BBA}"/>
+              </a:ext>
+            </a:extLst>
+          </p:cNvPr>
+          <p:cNvPicPr>
+            <a:picLocks noChangeAspect="1"/>
+          </p:cNvPicPr>
+          <p:nvPr/>
+        </p:nvPicPr>
+        <p:blipFill>
+          <a:blip r:embed="rId7">
+            <a:extLst>
+              <a:ext uri="{28A0092B-C50C-407E-A947-70E740481C1C}">
+                <a14:useLocalDpi xmlns:a14="http://schemas.microsoft.com/office/drawing/2010/main" val="0"/>
+              </a:ext>
+              <a:ext uri="{96DAC541-7B7A-43D3-8B79-37D633B846F1}">
+                <asvg:svgBlip xmlns:asvg="http://schemas.microsoft.com/office/drawing/2016/SVG/main" r:embed="rId8"/>
+              </a:ext>
+            </a:extLst>
+          </a:blip>
+          <a:stretch>
+            <a:fillRect/>
+          </a:stretch>
+        </p:blipFill>
+        <p:spPr>
+          <a:xfrm>
+            <a:off x="7305506" y="4210251"/>
+            <a:ext cx="780290" cy="780290"/>
+          </a:xfrm>
+          <a:prstGeom prst="rect">
+            <a:avLst/>
+          </a:prstGeom>
+        </p:spPr>
+      </p:pic>
+      <p:sp>
+        <p:nvSpPr>
+          <p:cNvPr id="59" name="TextBox 58">
+            <a:extLst>
+              <a:ext uri="{FF2B5EF4-FFF2-40B4-BE49-F238E27FC236}">
+                <a16:creationId xmlns:a16="http://schemas.microsoft.com/office/drawing/2014/main" id="{EBC30BE5-3131-4217-A609-50954A205943}"/>
+              </a:ext>
+            </a:extLst>
+          </p:cNvPr>
+          <p:cNvSpPr txBox="1"/>
+          <p:nvPr/>
+        </p:nvSpPr>
+        <p:spPr>
+          <a:xfrm>
+            <a:off x="7223514" y="2717074"/>
+            <a:ext cx="944105" cy="276999"/>
+          </a:xfrm>
+          <a:prstGeom prst="rect">
+            <a:avLst/>
+          </a:prstGeom>
+          <a:noFill/>
+        </p:spPr>
+        <p:txBody>
+          <a:bodyPr wrap="none" rtlCol="0">
+            <a:spAutoFit/>
+          </a:bodyPr>
+          <a:lstStyle/>
+          <a:p>
+            <a:r>
+              <a:rPr lang="en-US" sz="1200" dirty="0" err="1"/>
+              <a:t>UbuntuWAF</a:t>
+            </a:r>
+            <a:endParaRPr lang="en-US" sz="1200" dirty="0"/>
+          </a:p>
+        </p:txBody>
+      </p:sp>
+      <p:pic>
+        <p:nvPicPr>
+          <p:cNvPr id="60" name="Picture 59">
+            <a:extLst>
+              <a:ext uri="{FF2B5EF4-FFF2-40B4-BE49-F238E27FC236}">
+                <a16:creationId xmlns:a16="http://schemas.microsoft.com/office/drawing/2014/main" id="{D062495F-1E54-4E4C-A36D-B8D3326FD90B}"/>
+              </a:ext>
+            </a:extLst>
+          </p:cNvPr>
+          <p:cNvPicPr>
+            <a:picLocks noChangeAspect="1"/>
+          </p:cNvPicPr>
+          <p:nvPr/>
+        </p:nvPicPr>
+        <p:blipFill>
+          <a:blip r:embed="rId6">
+            <a:extLst>
+              <a:ext uri="{28A0092B-C50C-407E-A947-70E740481C1C}">
+                <a14:useLocalDpi xmlns:a14="http://schemas.microsoft.com/office/drawing/2010/main" val="0"/>
+              </a:ext>
+            </a:extLst>
+          </a:blip>
+          <a:stretch>
+            <a:fillRect/>
+          </a:stretch>
+        </p:blipFill>
+        <p:spPr>
+          <a:xfrm>
+            <a:off x="6902993" y="2292269"/>
+            <a:ext cx="390147" cy="390147"/>
+          </a:xfrm>
+          <a:prstGeom prst="rect">
+            <a:avLst/>
+          </a:prstGeom>
+        </p:spPr>
+      </p:pic>
+      <p:sp>
+        <p:nvSpPr>
+          <p:cNvPr id="63" name="Arrow: Right 62">
+            <a:extLst>
+              <a:ext uri="{FF2B5EF4-FFF2-40B4-BE49-F238E27FC236}">
+                <a16:creationId xmlns:a16="http://schemas.microsoft.com/office/drawing/2014/main" id="{FA4423B6-ED66-4392-A938-56CDBECD8F88}"/>
+              </a:ext>
+            </a:extLst>
+          </p:cNvPr>
+          <p:cNvSpPr/>
+          <p:nvPr/>
+        </p:nvSpPr>
+        <p:spPr>
+          <a:xfrm>
+            <a:off x="5300639" y="5365789"/>
+            <a:ext cx="1611067" cy="863721"/>
+          </a:xfrm>
+          <a:prstGeom prst="rightArrow">
+            <a:avLst/>
+          </a:prstGeom>
+        </p:spPr>
+        <p:style>
+          <a:lnRef idx="2">
+            <a:schemeClr val="accent2">
+              <a:shade val="50000"/>
+            </a:schemeClr>
+          </a:lnRef>
+          <a:fillRef idx="1">
+            <a:schemeClr val="accent2"/>
+          </a:fillRef>
+          <a:effectRef idx="0">
+            <a:schemeClr val="accent2"/>
+          </a:effectRef>
+          <a:fontRef idx="minor">
+            <a:schemeClr val="lt1"/>
+          </a:fontRef>
+        </p:style>
+        <p:txBody>
+          <a:bodyPr rtlCol="0" anchor="ctr"/>
+          <a:lstStyle/>
+          <a:p>
+            <a:pPr algn="ctr"/>
+            <a:endParaRPr lang="en-US"/>
+          </a:p>
+        </p:txBody>
+      </p:sp>
+      <p:pic>
+        <p:nvPicPr>
+          <p:cNvPr id="18" name="Graphic 17">
+            <a:extLst>
+              <a:ext uri="{FF2B5EF4-FFF2-40B4-BE49-F238E27FC236}">
+                <a16:creationId xmlns:a16="http://schemas.microsoft.com/office/drawing/2014/main" id="{D49BC404-D62E-4B5B-B30D-4932D20B879E}"/>
+              </a:ext>
+            </a:extLst>
+          </p:cNvPr>
+          <p:cNvPicPr>
+            <a:picLocks noChangeAspect="1"/>
+          </p:cNvPicPr>
+          <p:nvPr/>
+        </p:nvPicPr>
+        <p:blipFill>
+          <a:blip r:embed="rId9">
+            <a:extLst>
+              <a:ext uri="{28A0092B-C50C-407E-A947-70E740481C1C}">
+                <a14:useLocalDpi xmlns:a14="http://schemas.microsoft.com/office/drawing/2010/main" val="0"/>
+              </a:ext>
+              <a:ext uri="{96DAC541-7B7A-43D3-8B79-37D633B846F1}">
+                <asvg:svgBlip xmlns:asvg="http://schemas.microsoft.com/office/drawing/2016/SVG/main" r:embed="rId10"/>
+              </a:ext>
+            </a:extLst>
+          </a:blip>
+          <a:stretch>
+            <a:fillRect/>
+          </a:stretch>
+        </p:blipFill>
+        <p:spPr>
+          <a:xfrm>
+            <a:off x="5875204" y="2630233"/>
+            <a:ext cx="476250" cy="476250"/>
+          </a:xfrm>
+          <a:prstGeom prst="rect">
+            <a:avLst/>
+          </a:prstGeom>
+        </p:spPr>
+      </p:pic>
+      <p:pic>
+        <p:nvPicPr>
+          <p:cNvPr id="21" name="Graphic 20">
+            <a:extLst>
+              <a:ext uri="{FF2B5EF4-FFF2-40B4-BE49-F238E27FC236}">
+                <a16:creationId xmlns:a16="http://schemas.microsoft.com/office/drawing/2014/main" id="{82FD5A2C-408F-4BC9-A9B0-AC38BB298EF1}"/>
+              </a:ext>
+            </a:extLst>
+          </p:cNvPr>
+          <p:cNvPicPr>
+            <a:picLocks noChangeAspect="1"/>
+          </p:cNvPicPr>
+          <p:nvPr/>
+        </p:nvPicPr>
+        <p:blipFill>
+          <a:blip r:embed="rId11">
+            <a:extLst>
+              <a:ext uri="{28A0092B-C50C-407E-A947-70E740481C1C}">
+                <a14:useLocalDpi xmlns:a14="http://schemas.microsoft.com/office/drawing/2010/main" val="0"/>
+              </a:ext>
+              <a:ext uri="{96DAC541-7B7A-43D3-8B79-37D633B846F1}">
+                <asvg:svgBlip xmlns:asvg="http://schemas.microsoft.com/office/drawing/2016/SVG/main" r:embed="rId12"/>
+              </a:ext>
+            </a:extLst>
+          </a:blip>
+          <a:stretch>
+            <a:fillRect/>
+          </a:stretch>
+        </p:blipFill>
+        <p:spPr>
+          <a:xfrm>
+            <a:off x="5837275" y="5029964"/>
+            <a:ext cx="489478" cy="489478"/>
+          </a:xfrm>
+          <a:prstGeom prst="rect">
+            <a:avLst/>
+          </a:prstGeom>
+        </p:spPr>
+      </p:pic>
+      <p:sp>
+        <p:nvSpPr>
+          <p:cNvPr id="64" name="TextBox 63">
+            <a:extLst>
+              <a:ext uri="{FF2B5EF4-FFF2-40B4-BE49-F238E27FC236}">
+                <a16:creationId xmlns:a16="http://schemas.microsoft.com/office/drawing/2014/main" id="{89A1E7C9-C91C-4FCF-9C42-A0B16E84F819}"/>
+              </a:ext>
+            </a:extLst>
+          </p:cNvPr>
+          <p:cNvSpPr txBox="1"/>
+          <p:nvPr/>
+        </p:nvSpPr>
+        <p:spPr>
+          <a:xfrm>
+            <a:off x="5380471" y="5568687"/>
+            <a:ext cx="1277979" cy="461665"/>
+          </a:xfrm>
+          <a:prstGeom prst="rect">
+            <a:avLst/>
+          </a:prstGeom>
+          <a:noFill/>
+        </p:spPr>
+        <p:txBody>
+          <a:bodyPr wrap="none" rtlCol="0">
+            <a:spAutoFit/>
+          </a:bodyPr>
+          <a:lstStyle/>
+          <a:p>
+            <a:pPr algn="ctr"/>
+            <a:r>
+              <a:rPr lang="en-US" sz="1200" dirty="0">
+                <a:solidFill>
+                  <a:schemeClr val="bg1"/>
+                </a:solidFill>
+              </a:rPr>
+              <a:t>Azure Database</a:t>
+            </a:r>
+            <a:br>
+              <a:rPr lang="en-US" sz="1200" dirty="0">
+                <a:solidFill>
+                  <a:schemeClr val="bg1"/>
+                </a:solidFill>
+              </a:rPr>
+            </a:br>
+            <a:r>
+              <a:rPr lang="en-US" sz="1200" dirty="0">
+                <a:solidFill>
+                  <a:schemeClr val="bg1"/>
+                </a:solidFill>
+              </a:rPr>
+              <a:t>Migration Service</a:t>
+            </a:r>
+          </a:p>
+        </p:txBody>
+      </p:sp>
+      <p:sp>
+        <p:nvSpPr>
+          <p:cNvPr id="65" name="TextBox 64">
+            <a:extLst>
+              <a:ext uri="{FF2B5EF4-FFF2-40B4-BE49-F238E27FC236}">
+                <a16:creationId xmlns:a16="http://schemas.microsoft.com/office/drawing/2014/main" id="{5FC0D03A-AD9C-4A58-BB00-C72E174B1E11}"/>
+              </a:ext>
+            </a:extLst>
+          </p:cNvPr>
+          <p:cNvSpPr txBox="1"/>
+          <p:nvPr/>
+        </p:nvSpPr>
+        <p:spPr>
+          <a:xfrm>
+            <a:off x="5642772" y="3098852"/>
+            <a:ext cx="810158" cy="461665"/>
+          </a:xfrm>
+          <a:prstGeom prst="rect">
+            <a:avLst/>
+          </a:prstGeom>
+          <a:noFill/>
+        </p:spPr>
+        <p:txBody>
+          <a:bodyPr wrap="none" rtlCol="0">
+            <a:spAutoFit/>
+          </a:bodyPr>
+          <a:lstStyle/>
+          <a:p>
+            <a:pPr algn="ctr"/>
+            <a:r>
+              <a:rPr lang="en-US" sz="1200" dirty="0">
+                <a:solidFill>
+                  <a:schemeClr val="bg1"/>
+                </a:solidFill>
+              </a:rPr>
+              <a:t>Azure Site</a:t>
+            </a:r>
+            <a:br>
+              <a:rPr lang="en-US" sz="1200" dirty="0">
+                <a:solidFill>
+                  <a:schemeClr val="bg1"/>
+                </a:solidFill>
+              </a:rPr>
+            </a:br>
+            <a:r>
+              <a:rPr lang="en-US" sz="1200" dirty="0">
+                <a:solidFill>
+                  <a:schemeClr val="bg1"/>
+                </a:solidFill>
+              </a:rPr>
+              <a:t>Recovery</a:t>
+            </a:r>
+          </a:p>
+        </p:txBody>
+      </p:sp>
+      <p:pic>
+        <p:nvPicPr>
+          <p:cNvPr id="36" name="Picture 35">
+            <a:extLst>
+              <a:ext uri="{FF2B5EF4-FFF2-40B4-BE49-F238E27FC236}">
+                <a16:creationId xmlns:a16="http://schemas.microsoft.com/office/drawing/2014/main" id="{A84BC766-5BED-4455-9184-3FA3B1850AC1}"/>
+              </a:ext>
+            </a:extLst>
+          </p:cNvPr>
+          <p:cNvPicPr>
+            <a:picLocks noChangeAspect="1"/>
+          </p:cNvPicPr>
+          <p:nvPr/>
+        </p:nvPicPr>
+        <p:blipFill>
+          <a:blip r:embed="rId13">
+            <a:extLst>
+              <a:ext uri="{28A0092B-C50C-407E-A947-70E740481C1C}">
+                <a14:useLocalDpi xmlns:a14="http://schemas.microsoft.com/office/drawing/2010/main" val="0"/>
+              </a:ext>
+            </a:extLst>
+          </a:blip>
+          <a:stretch>
+            <a:fillRect/>
+          </a:stretch>
+        </p:blipFill>
+        <p:spPr>
+          <a:xfrm>
+            <a:off x="1648474" y="2998354"/>
+            <a:ext cx="942035" cy="403729"/>
+          </a:xfrm>
+          <a:prstGeom prst="rect">
+            <a:avLst/>
+          </a:prstGeom>
+        </p:spPr>
+      </p:pic>
+      <p:pic>
+        <p:nvPicPr>
+          <p:cNvPr id="66" name="Picture 65">
+            <a:extLst>
+              <a:ext uri="{FF2B5EF4-FFF2-40B4-BE49-F238E27FC236}">
+                <a16:creationId xmlns:a16="http://schemas.microsoft.com/office/drawing/2014/main" id="{A936C4AB-F4C0-42AC-8752-757CFCEED18B}"/>
+              </a:ext>
+            </a:extLst>
+          </p:cNvPr>
+          <p:cNvPicPr>
+            <a:picLocks noChangeAspect="1"/>
+          </p:cNvPicPr>
+          <p:nvPr/>
+        </p:nvPicPr>
+        <p:blipFill rotWithShape="1">
+          <a:blip r:embed="rId13">
+            <a:extLst>
+              <a:ext uri="{28A0092B-C50C-407E-A947-70E740481C1C}">
+                <a14:useLocalDpi xmlns:a14="http://schemas.microsoft.com/office/drawing/2010/main" val="0"/>
+              </a:ext>
+            </a:extLst>
+          </a:blip>
+          <a:srcRect l="-2" r="57964"/>
+          <a:stretch/>
+        </p:blipFill>
+        <p:spPr>
+          <a:xfrm>
+            <a:off x="3672252" y="3206189"/>
+            <a:ext cx="396000" cy="403729"/>
+          </a:xfrm>
+          <a:prstGeom prst="rect">
+            <a:avLst/>
+          </a:prstGeom>
+        </p:spPr>
+      </p:pic>
+      <p:pic>
+        <p:nvPicPr>
+          <p:cNvPr id="67" name="Picture 66">
+            <a:extLst>
+              <a:ext uri="{FF2B5EF4-FFF2-40B4-BE49-F238E27FC236}">
+                <a16:creationId xmlns:a16="http://schemas.microsoft.com/office/drawing/2014/main" id="{793C9BF0-163E-4121-9955-F4C0E827ECE2}"/>
+              </a:ext>
+            </a:extLst>
+          </p:cNvPr>
+          <p:cNvPicPr>
+            <a:picLocks noChangeAspect="1"/>
+          </p:cNvPicPr>
+          <p:nvPr/>
+        </p:nvPicPr>
+        <p:blipFill rotWithShape="1">
+          <a:blip r:embed="rId13">
+            <a:extLst>
+              <a:ext uri="{28A0092B-C50C-407E-A947-70E740481C1C}">
+                <a14:useLocalDpi xmlns:a14="http://schemas.microsoft.com/office/drawing/2010/main" val="0"/>
+              </a:ext>
+            </a:extLst>
+          </a:blip>
+          <a:srcRect l="-2" r="57964"/>
+          <a:stretch/>
+        </p:blipFill>
+        <p:spPr>
+          <a:xfrm>
+            <a:off x="3672252" y="4330917"/>
+            <a:ext cx="396000" cy="403729"/>
+          </a:xfrm>
+          <a:prstGeom prst="rect">
+            <a:avLst/>
+          </a:prstGeom>
+        </p:spPr>
+      </p:pic>
+      <p:pic>
+        <p:nvPicPr>
+          <p:cNvPr id="68" name="Picture 67">
+            <a:extLst>
+              <a:ext uri="{FF2B5EF4-FFF2-40B4-BE49-F238E27FC236}">
+                <a16:creationId xmlns:a16="http://schemas.microsoft.com/office/drawing/2014/main" id="{DA4DB010-018E-462A-BDE6-C3DBE508D93D}"/>
+              </a:ext>
+            </a:extLst>
+          </p:cNvPr>
+          <p:cNvPicPr>
+            <a:picLocks noChangeAspect="1"/>
+          </p:cNvPicPr>
+          <p:nvPr/>
+        </p:nvPicPr>
+        <p:blipFill rotWithShape="1">
+          <a:blip r:embed="rId13">
+            <a:extLst>
+              <a:ext uri="{28A0092B-C50C-407E-A947-70E740481C1C}">
+                <a14:useLocalDpi xmlns:a14="http://schemas.microsoft.com/office/drawing/2010/main" val="0"/>
+              </a:ext>
+            </a:extLst>
+          </a:blip>
+          <a:srcRect l="-2" r="57964"/>
+          <a:stretch/>
+        </p:blipFill>
+        <p:spPr>
+          <a:xfrm>
+            <a:off x="3660035" y="5501351"/>
+            <a:ext cx="396000" cy="403729"/>
+          </a:xfrm>
+          <a:prstGeom prst="rect">
+            <a:avLst/>
+          </a:prstGeom>
+        </p:spPr>
+      </p:pic>
+      <p:pic>
+        <p:nvPicPr>
+          <p:cNvPr id="69" name="Picture 68">
+            <a:extLst>
+              <a:ext uri="{FF2B5EF4-FFF2-40B4-BE49-F238E27FC236}">
+                <a16:creationId xmlns:a16="http://schemas.microsoft.com/office/drawing/2014/main" id="{42A1967B-0B24-4E01-9E13-74A06ED441B5}"/>
+              </a:ext>
+            </a:extLst>
+          </p:cNvPr>
+          <p:cNvPicPr>
+            <a:picLocks noChangeAspect="1"/>
+          </p:cNvPicPr>
+          <p:nvPr/>
+        </p:nvPicPr>
+        <p:blipFill rotWithShape="1">
+          <a:blip r:embed="rId13">
+            <a:extLst>
+              <a:ext uri="{28A0092B-C50C-407E-A947-70E740481C1C}">
+                <a14:useLocalDpi xmlns:a14="http://schemas.microsoft.com/office/drawing/2010/main" val="0"/>
+              </a:ext>
+            </a:extLst>
+          </a:blip>
+          <a:srcRect l="-2" r="57964"/>
+          <a:stretch/>
+        </p:blipFill>
+        <p:spPr>
+          <a:xfrm>
+            <a:off x="6888550" y="4551734"/>
+            <a:ext cx="396000" cy="403729"/>
+          </a:xfrm>
+          <a:prstGeom prst="rect">
+            <a:avLst/>
+          </a:prstGeom>
+        </p:spPr>
+      </p:pic>
+      <p:pic>
+        <p:nvPicPr>
+          <p:cNvPr id="70" name="Picture 69">
+            <a:extLst>
+              <a:ext uri="{FF2B5EF4-FFF2-40B4-BE49-F238E27FC236}">
+                <a16:creationId xmlns:a16="http://schemas.microsoft.com/office/drawing/2014/main" id="{6147A1C9-DA14-40C7-855C-22FC4B3B3862}"/>
+              </a:ext>
+            </a:extLst>
+          </p:cNvPr>
+          <p:cNvPicPr>
+            <a:picLocks noChangeAspect="1"/>
+          </p:cNvPicPr>
+          <p:nvPr/>
+        </p:nvPicPr>
+        <p:blipFill rotWithShape="1">
+          <a:blip r:embed="rId13">
+            <a:extLst>
+              <a:ext uri="{28A0092B-C50C-407E-A947-70E740481C1C}">
+                <a14:useLocalDpi xmlns:a14="http://schemas.microsoft.com/office/drawing/2010/main" val="0"/>
+              </a:ext>
+            </a:extLst>
+          </a:blip>
+          <a:srcRect l="-2" r="57964"/>
+          <a:stretch/>
+        </p:blipFill>
+        <p:spPr>
+          <a:xfrm>
+            <a:off x="6910606" y="3433157"/>
+            <a:ext cx="396000" cy="403729"/>
+          </a:xfrm>
+          <a:prstGeom prst="rect">
+            <a:avLst/>
+          </a:prstGeom>
+        </p:spPr>
+      </p:pic>
+      <p:pic>
+        <p:nvPicPr>
+          <p:cNvPr id="71" name="Graphic 70">
+            <a:extLst>
+              <a:ext uri="{FF2B5EF4-FFF2-40B4-BE49-F238E27FC236}">
+                <a16:creationId xmlns:a16="http://schemas.microsoft.com/office/drawing/2014/main" id="{559C6BD3-9BC6-4859-A0FB-B5C328DBD84F}"/>
+              </a:ext>
+            </a:extLst>
+          </p:cNvPr>
+          <p:cNvPicPr>
+            <a:picLocks noChangeAspect="1"/>
+          </p:cNvPicPr>
+          <p:nvPr/>
+        </p:nvPicPr>
+        <p:blipFill>
+          <a:blip r:embed="rId14">
+            <a:extLst>
+              <a:ext uri="{28A0092B-C50C-407E-A947-70E740481C1C}">
+                <a14:useLocalDpi xmlns:a14="http://schemas.microsoft.com/office/drawing/2010/main" val="0"/>
+              </a:ext>
+              <a:ext uri="{96DAC541-7B7A-43D3-8B79-37D633B846F1}">
+                <asvg:svgBlip xmlns:asvg="http://schemas.microsoft.com/office/drawing/2016/SVG/main" r:embed="rId15"/>
+              </a:ext>
+            </a:extLst>
+          </a:blip>
+          <a:stretch>
+            <a:fillRect/>
+          </a:stretch>
+        </p:blipFill>
+        <p:spPr>
+          <a:xfrm>
+            <a:off x="127349" y="3098852"/>
+            <a:ext cx="1231983" cy="951987"/>
+          </a:xfrm>
+          <a:prstGeom prst="rect">
+            <a:avLst/>
+          </a:prstGeom>
+        </p:spPr>
+      </p:pic>
+      <p:pic>
+        <p:nvPicPr>
+          <p:cNvPr id="72" name="Graphic 71">
+            <a:extLst>
+              <a:ext uri="{FF2B5EF4-FFF2-40B4-BE49-F238E27FC236}">
+                <a16:creationId xmlns:a16="http://schemas.microsoft.com/office/drawing/2014/main" id="{35C81F81-7B26-4B7E-BBA5-01AB7D0AAB23}"/>
+              </a:ext>
+            </a:extLst>
+          </p:cNvPr>
+          <p:cNvPicPr>
+            <a:picLocks noChangeAspect="1"/>
+          </p:cNvPicPr>
+          <p:nvPr/>
+        </p:nvPicPr>
+        <p:blipFill>
+          <a:blip r:embed="rId16">
+            <a:extLst>
+              <a:ext uri="{28A0092B-C50C-407E-A947-70E740481C1C}">
+                <a14:useLocalDpi xmlns:a14="http://schemas.microsoft.com/office/drawing/2010/main" val="0"/>
+              </a:ext>
+              <a:ext uri="{96DAC541-7B7A-43D3-8B79-37D633B846F1}">
+                <asvg:svgBlip xmlns:asvg="http://schemas.microsoft.com/office/drawing/2016/SVG/main" r:embed="rId17"/>
+              </a:ext>
+            </a:extLst>
+          </a:blip>
+          <a:stretch>
+            <a:fillRect/>
+          </a:stretch>
+        </p:blipFill>
+        <p:spPr>
+          <a:xfrm>
+            <a:off x="8924738" y="3452955"/>
+            <a:ext cx="538058" cy="538058"/>
+          </a:xfrm>
+          <a:prstGeom prst="rect">
+            <a:avLst/>
+          </a:prstGeom>
+        </p:spPr>
+      </p:pic>
+      <p:sp>
+        <p:nvSpPr>
+          <p:cNvPr id="73" name="Rectangle 72">
+            <a:extLst>
+              <a:ext uri="{FF2B5EF4-FFF2-40B4-BE49-F238E27FC236}">
+                <a16:creationId xmlns:a16="http://schemas.microsoft.com/office/drawing/2014/main" id="{9A7289F7-2A10-4B68-8934-76CEB5E7BB70}"/>
+              </a:ext>
+            </a:extLst>
+          </p:cNvPr>
+          <p:cNvSpPr/>
+          <p:nvPr/>
+        </p:nvSpPr>
+        <p:spPr>
+          <a:xfrm>
+            <a:off x="6860371" y="412306"/>
+            <a:ext cx="1627439" cy="1211295"/>
+          </a:xfrm>
+          <a:prstGeom prst="rect">
+            <a:avLst/>
+          </a:prstGeom>
+          <a:noFill/>
+          <a:ln>
+            <a:solidFill>
+              <a:schemeClr val="tx1"/>
+            </a:solidFill>
+            <a:prstDash val="dash"/>
+          </a:ln>
+        </p:spPr>
+        <p:style>
+          <a:lnRef idx="2">
+            <a:schemeClr val="accent1">
+              <a:shade val="50000"/>
+            </a:schemeClr>
+          </a:lnRef>
+          <a:fillRef idx="1">
+            <a:schemeClr val="accent1"/>
+          </a:fillRef>
+          <a:effectRef idx="0">
+            <a:schemeClr val="accent1"/>
+          </a:effectRef>
+          <a:fontRef idx="minor">
+            <a:schemeClr val="lt1"/>
+          </a:fontRef>
+        </p:style>
+        <p:txBody>
+          <a:bodyPr rtlCol="0" anchor="ctr"/>
+          <a:lstStyle/>
+          <a:p>
+            <a:pPr algn="ctr"/>
+            <a:endParaRPr lang="en-US"/>
+          </a:p>
+        </p:txBody>
+      </p:sp>
+      <p:grpSp>
+        <p:nvGrpSpPr>
+          <p:cNvPr id="82" name="Group 81">
+            <a:extLst>
+              <a:ext uri="{FF2B5EF4-FFF2-40B4-BE49-F238E27FC236}">
+                <a16:creationId xmlns:a16="http://schemas.microsoft.com/office/drawing/2014/main" id="{96DE75B3-F88A-4CEE-96C3-912BA8DC493B}"/>
+              </a:ext>
+            </a:extLst>
+          </p:cNvPr>
+          <p:cNvGrpSpPr/>
+          <p:nvPr/>
+        </p:nvGrpSpPr>
+        <p:grpSpPr>
+          <a:xfrm>
+            <a:off x="6888550" y="521678"/>
+            <a:ext cx="1583729" cy="909178"/>
+            <a:chOff x="6888550" y="376608"/>
+            <a:chExt cx="1583729" cy="909178"/>
+          </a:xfrm>
+        </p:grpSpPr>
+        <p:pic>
+          <p:nvPicPr>
+            <p:cNvPr id="78" name="Picture 77">
+              <a:extLst>
+                <a:ext uri="{FF2B5EF4-FFF2-40B4-BE49-F238E27FC236}">
+                  <a16:creationId xmlns:a16="http://schemas.microsoft.com/office/drawing/2014/main" id="{28CE491C-266D-405D-858B-3F54A77A137C}"/>
+                </a:ext>
+              </a:extLst>
+            </p:cNvPr>
+            <p:cNvPicPr>
+              <a:picLocks noChangeAspect="1"/>
+            </p:cNvPicPr>
+            <p:nvPr/>
+          </p:nvPicPr>
+          <p:blipFill rotWithShape="1">
+            <a:blip r:embed="rId18" cstate="print">
+              <a:extLst>
+                <a:ext uri="{28A0092B-C50C-407E-A947-70E740481C1C}">
+                  <a14:useLocalDpi xmlns:a14="http://schemas.microsoft.com/office/drawing/2010/main"/>
+                </a:ext>
+              </a:extLst>
+            </a:blip>
+            <a:srcRect/>
+            <a:stretch/>
+          </p:blipFill>
+          <p:spPr>
+            <a:xfrm>
+              <a:off x="6888550" y="376608"/>
+              <a:ext cx="1583729" cy="909178"/>
+            </a:xfrm>
+            <a:prstGeom prst="rect">
+              <a:avLst/>
+            </a:prstGeom>
+          </p:spPr>
+        </p:pic>
+        <p:sp>
+          <p:nvSpPr>
+            <p:cNvPr id="79" name="TextBox 78">
+              <a:extLst>
+                <a:ext uri="{FF2B5EF4-FFF2-40B4-BE49-F238E27FC236}">
+                  <a16:creationId xmlns:a16="http://schemas.microsoft.com/office/drawing/2014/main" id="{75EB0CC6-3862-42C7-878A-E14F6DE5E1D3}"/>
+                </a:ext>
+              </a:extLst>
+            </p:cNvPr>
+            <p:cNvSpPr txBox="1"/>
+            <p:nvPr/>
+          </p:nvSpPr>
+          <p:spPr>
+            <a:xfrm>
+              <a:off x="7210132" y="699460"/>
+              <a:ext cx="148836" cy="169277"/>
+            </a:xfrm>
+            <a:prstGeom prst="rect">
+              <a:avLst/>
+            </a:prstGeom>
+            <a:solidFill>
+              <a:schemeClr val="bg1"/>
+            </a:solidFill>
+          </p:spPr>
+          <p:txBody>
+            <a:bodyPr wrap="square" lIns="0" tIns="0" rIns="0" bIns="0" rtlCol="0" anchor="ctr" anchorCtr="0">
+              <a:spAutoFit/>
+            </a:bodyPr>
+            <a:lstStyle/>
+            <a:p>
+              <a:pPr algn="ctr"/>
+              <a:r>
+                <a:rPr lang="en-IE" sz="1100" dirty="0"/>
+                <a:t>3</a:t>
+              </a:r>
+            </a:p>
+          </p:txBody>
+        </p:sp>
+        <p:sp>
+          <p:nvSpPr>
+            <p:cNvPr id="80" name="TextBox 79">
+              <a:extLst>
+                <a:ext uri="{FF2B5EF4-FFF2-40B4-BE49-F238E27FC236}">
+                  <a16:creationId xmlns:a16="http://schemas.microsoft.com/office/drawing/2014/main" id="{8CE59D31-44B3-42F6-8C3E-DDE1FF3CC96F}"/>
+                </a:ext>
+              </a:extLst>
+            </p:cNvPr>
+            <p:cNvSpPr txBox="1"/>
+            <p:nvPr/>
+          </p:nvSpPr>
+          <p:spPr>
+            <a:xfrm>
+              <a:off x="7818956" y="704619"/>
+              <a:ext cx="107309" cy="130361"/>
+            </a:xfrm>
+            <a:prstGeom prst="rect">
+              <a:avLst/>
+            </a:prstGeom>
+            <a:solidFill>
+              <a:schemeClr val="bg1"/>
+            </a:solidFill>
+          </p:spPr>
+          <p:txBody>
+            <a:bodyPr wrap="square" lIns="0" tIns="0" rIns="0" bIns="0" rtlCol="0" anchor="t" anchorCtr="0">
+              <a:noAutofit/>
+            </a:bodyPr>
+            <a:lstStyle/>
+            <a:p>
+              <a:pPr algn="ctr"/>
+              <a:r>
+                <a:rPr lang="en-IE" sz="900" dirty="0"/>
+                <a:t>1</a:t>
+              </a:r>
+            </a:p>
+          </p:txBody>
+        </p:sp>
+        <p:sp>
+          <p:nvSpPr>
+            <p:cNvPr id="81" name="TextBox 80">
+              <a:extLst>
+                <a:ext uri="{FF2B5EF4-FFF2-40B4-BE49-F238E27FC236}">
+                  <a16:creationId xmlns:a16="http://schemas.microsoft.com/office/drawing/2014/main" id="{E9B0541F-469F-4A46-8542-A811F65DCA7B}"/>
+                </a:ext>
+              </a:extLst>
+            </p:cNvPr>
+            <p:cNvSpPr txBox="1"/>
+            <p:nvPr/>
+          </p:nvSpPr>
+          <p:spPr>
+            <a:xfrm>
+              <a:off x="7820225" y="481751"/>
+              <a:ext cx="107309" cy="130361"/>
+            </a:xfrm>
+            <a:prstGeom prst="rect">
+              <a:avLst/>
+            </a:prstGeom>
+            <a:solidFill>
+              <a:schemeClr val="bg1"/>
+            </a:solidFill>
+          </p:spPr>
+          <p:txBody>
+            <a:bodyPr wrap="square" lIns="0" tIns="0" rIns="0" bIns="0" rtlCol="0" anchor="t" anchorCtr="0">
+              <a:noAutofit/>
+            </a:bodyPr>
+            <a:lstStyle/>
+            <a:p>
+              <a:pPr algn="ctr"/>
+              <a:r>
+                <a:rPr lang="en-IE" sz="900" dirty="0"/>
+                <a:t>2</a:t>
+              </a:r>
+            </a:p>
+          </p:txBody>
+        </p:sp>
+      </p:grpSp>
+      <p:grpSp>
+        <p:nvGrpSpPr>
+          <p:cNvPr id="83" name="Group 82">
+            <a:extLst>
+              <a:ext uri="{FF2B5EF4-FFF2-40B4-BE49-F238E27FC236}">
+                <a16:creationId xmlns:a16="http://schemas.microsoft.com/office/drawing/2014/main" id="{725B8826-C8DF-451C-A0AD-708ECB26299F}"/>
+              </a:ext>
+            </a:extLst>
+          </p:cNvPr>
+          <p:cNvGrpSpPr/>
+          <p:nvPr/>
+        </p:nvGrpSpPr>
+        <p:grpSpPr>
+          <a:xfrm>
+            <a:off x="5300639" y="792225"/>
+            <a:ext cx="1611067" cy="1039595"/>
+            <a:chOff x="5300639" y="792225"/>
+            <a:chExt cx="1611067" cy="1039595"/>
+          </a:xfrm>
+        </p:grpSpPr>
+        <p:sp>
+          <p:nvSpPr>
+            <p:cNvPr id="74" name="Arrow: Right 73">
+              <a:extLst>
+                <a:ext uri="{FF2B5EF4-FFF2-40B4-BE49-F238E27FC236}">
+                  <a16:creationId xmlns:a16="http://schemas.microsoft.com/office/drawing/2014/main" id="{66807033-6837-4384-94E1-205B24D75434}"/>
+                </a:ext>
+              </a:extLst>
+            </p:cNvPr>
+            <p:cNvSpPr/>
+            <p:nvPr/>
+          </p:nvSpPr>
+          <p:spPr>
+            <a:xfrm>
+              <a:off x="5300639" y="1051530"/>
+              <a:ext cx="1611067" cy="780290"/>
+            </a:xfrm>
+            <a:prstGeom prst="rightArrow">
+              <a:avLst/>
+            </a:prstGeom>
+          </p:spPr>
+          <p:style>
+            <a:lnRef idx="2">
+              <a:schemeClr val="accent1">
+                <a:shade val="50000"/>
+              </a:schemeClr>
+            </a:lnRef>
+            <a:fillRef idx="1">
+              <a:schemeClr val="accent1"/>
+            </a:fillRef>
+            <a:effectRef idx="0">
+              <a:schemeClr val="accent1"/>
+            </a:effectRef>
+            <a:fontRef idx="minor">
+              <a:schemeClr val="lt1"/>
+            </a:fontRef>
+          </p:style>
+          <p:txBody>
+            <a:bodyPr rtlCol="0" anchor="ctr"/>
+            <a:lstStyle/>
+            <a:p>
+              <a:pPr algn="ctr"/>
+              <a:endParaRPr lang="en-US"/>
+            </a:p>
+          </p:txBody>
+        </p:sp>
+        <p:pic>
+          <p:nvPicPr>
+            <p:cNvPr id="76" name="Graphic 75">
+              <a:extLst>
+                <a:ext uri="{FF2B5EF4-FFF2-40B4-BE49-F238E27FC236}">
+                  <a16:creationId xmlns:a16="http://schemas.microsoft.com/office/drawing/2014/main" id="{EAE5D799-0116-4B37-A358-175CDE308FFD}"/>
+                </a:ext>
+              </a:extLst>
+            </p:cNvPr>
+            <p:cNvPicPr>
+              <a:picLocks noChangeAspect="1"/>
+            </p:cNvPicPr>
+            <p:nvPr/>
+          </p:nvPicPr>
+          <p:blipFill>
+            <a:blip r:embed="rId19">
+              <a:extLst>
+                <a:ext uri="{28A0092B-C50C-407E-A947-70E740481C1C}">
+                  <a14:useLocalDpi xmlns:a14="http://schemas.microsoft.com/office/drawing/2010/main" val="0"/>
+                </a:ext>
+                <a:ext uri="{96DAC541-7B7A-43D3-8B79-37D633B846F1}">
+                  <asvg:svgBlip xmlns:asvg="http://schemas.microsoft.com/office/drawing/2016/SVG/main" r:embed="rId20"/>
+                </a:ext>
+              </a:extLst>
+            </a:blip>
+            <a:stretch>
+              <a:fillRect/>
+            </a:stretch>
+          </p:blipFill>
+          <p:spPr>
+            <a:xfrm>
+              <a:off x="5850503" y="792225"/>
+              <a:ext cx="476250" cy="476250"/>
+            </a:xfrm>
+            <a:prstGeom prst="rect">
+              <a:avLst/>
+            </a:prstGeom>
+          </p:spPr>
+        </p:pic>
+        <p:sp>
+          <p:nvSpPr>
+            <p:cNvPr id="77" name="TextBox 76">
+              <a:extLst>
+                <a:ext uri="{FF2B5EF4-FFF2-40B4-BE49-F238E27FC236}">
+                  <a16:creationId xmlns:a16="http://schemas.microsoft.com/office/drawing/2014/main" id="{245659D4-0C63-43CC-A5E6-F8403A8CD6EC}"/>
+                </a:ext>
+              </a:extLst>
+            </p:cNvPr>
+            <p:cNvSpPr txBox="1"/>
+            <p:nvPr/>
+          </p:nvSpPr>
+          <p:spPr>
+            <a:xfrm>
+              <a:off x="5759915" y="1220411"/>
+              <a:ext cx="672172" cy="461665"/>
+            </a:xfrm>
+            <a:prstGeom prst="rect">
+              <a:avLst/>
+            </a:prstGeom>
+            <a:noFill/>
+          </p:spPr>
+          <p:txBody>
+            <a:bodyPr wrap="none" rtlCol="0">
+              <a:spAutoFit/>
+            </a:bodyPr>
+            <a:lstStyle/>
+            <a:p>
+              <a:pPr algn="ctr"/>
+              <a:r>
+                <a:rPr lang="en-US" sz="1200" dirty="0">
+                  <a:solidFill>
+                    <a:schemeClr val="bg1"/>
+                  </a:solidFill>
+                </a:rPr>
+                <a:t>Azure</a:t>
+              </a:r>
+            </a:p>
+            <a:p>
+              <a:pPr algn="ctr"/>
+              <a:r>
+                <a:rPr lang="en-US" sz="1200" dirty="0">
+                  <a:solidFill>
+                    <a:schemeClr val="bg1"/>
+                  </a:solidFill>
+                </a:rPr>
+                <a:t>Migrate</a:t>
+              </a:r>
+            </a:p>
+          </p:txBody>
+        </p:sp>
+      </p:grpSp>
     </p:spTree>
     <p:extLst>
       <p:ext uri="{BB962C8B-B14F-4D97-AF65-F5344CB8AC3E}">
-        <p14:creationId xmlns:p14="http://schemas.microsoft.com/office/powerpoint/2010/main" val="2362318999"/>
+        <p14:creationId xmlns:p14="http://schemas.microsoft.com/office/powerpoint/2010/main" val="696907495"/>
       </p:ext>
     </p:extLst>
   </p:cSld>

</xml_diff>

<commit_message>
Fixed #4, other changes
Fixed #4.
Updated all dates to May 2019
Added 'Deploy to Azure' button to 'Before the HOL' doc
</commit_message>
<xml_diff>
--- a/Hands-on lab/Images/image-source.pptx
+++ b/Hands-on lab/Images/image-source.pptx
@@ -6,6 +6,7 @@
   </p:sldMasterIdLst>
   <p:sldIdLst>
     <p:sldId id="257" r:id="rId2"/>
+    <p:sldId id="258" r:id="rId3"/>
   </p:sldIdLst>
   <p:sldSz cx="12192000" cy="6858000"/>
   <p:notesSz cx="6858000" cy="9144000"/>
@@ -261,7 +262,7 @@
           <a:p>
             <a:fld id="{9F1BFCDA-4DF7-4C82-AD84-C667DD7FA52D}" type="datetimeFigureOut">
               <a:rPr lang="en-IE" smtClean="0"/>
-              <a:t>17/04/2019</a:t>
+              <a:t>03/05/2019</a:t>
             </a:fld>
             <a:endParaRPr lang="en-IE"/>
           </a:p>
@@ -461,7 +462,7 @@
           <a:p>
             <a:fld id="{9F1BFCDA-4DF7-4C82-AD84-C667DD7FA52D}" type="datetimeFigureOut">
               <a:rPr lang="en-IE" smtClean="0"/>
-              <a:t>17/04/2019</a:t>
+              <a:t>03/05/2019</a:t>
             </a:fld>
             <a:endParaRPr lang="en-IE"/>
           </a:p>
@@ -671,7 +672,7 @@
           <a:p>
             <a:fld id="{9F1BFCDA-4DF7-4C82-AD84-C667DD7FA52D}" type="datetimeFigureOut">
               <a:rPr lang="en-IE" smtClean="0"/>
-              <a:t>17/04/2019</a:t>
+              <a:t>03/05/2019</a:t>
             </a:fld>
             <a:endParaRPr lang="en-IE"/>
           </a:p>
@@ -871,7 +872,7 @@
           <a:p>
             <a:fld id="{9F1BFCDA-4DF7-4C82-AD84-C667DD7FA52D}" type="datetimeFigureOut">
               <a:rPr lang="en-IE" smtClean="0"/>
-              <a:t>17/04/2019</a:t>
+              <a:t>03/05/2019</a:t>
             </a:fld>
             <a:endParaRPr lang="en-IE"/>
           </a:p>
@@ -1147,7 +1148,7 @@
           <a:p>
             <a:fld id="{9F1BFCDA-4DF7-4C82-AD84-C667DD7FA52D}" type="datetimeFigureOut">
               <a:rPr lang="en-IE" smtClean="0"/>
-              <a:t>17/04/2019</a:t>
+              <a:t>03/05/2019</a:t>
             </a:fld>
             <a:endParaRPr lang="en-IE"/>
           </a:p>
@@ -1415,7 +1416,7 @@
           <a:p>
             <a:fld id="{9F1BFCDA-4DF7-4C82-AD84-C667DD7FA52D}" type="datetimeFigureOut">
               <a:rPr lang="en-IE" smtClean="0"/>
-              <a:t>17/04/2019</a:t>
+              <a:t>03/05/2019</a:t>
             </a:fld>
             <a:endParaRPr lang="en-IE"/>
           </a:p>
@@ -1830,7 +1831,7 @@
           <a:p>
             <a:fld id="{9F1BFCDA-4DF7-4C82-AD84-C667DD7FA52D}" type="datetimeFigureOut">
               <a:rPr lang="en-IE" smtClean="0"/>
-              <a:t>17/04/2019</a:t>
+              <a:t>03/05/2019</a:t>
             </a:fld>
             <a:endParaRPr lang="en-IE"/>
           </a:p>
@@ -1972,7 +1973,7 @@
           <a:p>
             <a:fld id="{9F1BFCDA-4DF7-4C82-AD84-C667DD7FA52D}" type="datetimeFigureOut">
               <a:rPr lang="en-IE" smtClean="0"/>
-              <a:t>17/04/2019</a:t>
+              <a:t>03/05/2019</a:t>
             </a:fld>
             <a:endParaRPr lang="en-IE"/>
           </a:p>
@@ -2085,7 +2086,7 @@
           <a:p>
             <a:fld id="{9F1BFCDA-4DF7-4C82-AD84-C667DD7FA52D}" type="datetimeFigureOut">
               <a:rPr lang="en-IE" smtClean="0"/>
-              <a:t>17/04/2019</a:t>
+              <a:t>03/05/2019</a:t>
             </a:fld>
             <a:endParaRPr lang="en-IE"/>
           </a:p>
@@ -2398,7 +2399,7 @@
           <a:p>
             <a:fld id="{9F1BFCDA-4DF7-4C82-AD84-C667DD7FA52D}" type="datetimeFigureOut">
               <a:rPr lang="en-IE" smtClean="0"/>
-              <a:t>17/04/2019</a:t>
+              <a:t>03/05/2019</a:t>
             </a:fld>
             <a:endParaRPr lang="en-IE"/>
           </a:p>
@@ -2687,7 +2688,7 @@
           <a:p>
             <a:fld id="{9F1BFCDA-4DF7-4C82-AD84-C667DD7FA52D}" type="datetimeFigureOut">
               <a:rPr lang="en-IE" smtClean="0"/>
-              <a:t>17/04/2019</a:t>
+              <a:t>03/05/2019</a:t>
             </a:fld>
             <a:endParaRPr lang="en-IE"/>
           </a:p>
@@ -2930,7 +2931,7 @@
           <a:p>
             <a:fld id="{9F1BFCDA-4DF7-4C82-AD84-C667DD7FA52D}" type="datetimeFigureOut">
               <a:rPr lang="en-IE" smtClean="0"/>
-              <a:t>17/04/2019</a:t>
+              <a:t>03/05/2019</a:t>
             </a:fld>
             <a:endParaRPr lang="en-IE"/>
           </a:p>
@@ -5482,6 +5483,140 @@
 </p:sld>
 </file>
 
+<file path=ppt/slides/slide2.xml><?xml version="1.0" encoding="utf-8"?>
+<p:sld xmlns:a="http://schemas.openxmlformats.org/drawingml/2006/main" xmlns:r="http://schemas.openxmlformats.org/officeDocument/2006/relationships" xmlns:p="http://schemas.openxmlformats.org/presentationml/2006/main">
+  <p:cSld>
+    <p:bg>
+      <p:bgPr>
+        <a:solidFill>
+          <a:schemeClr val="bg1">
+            <a:alpha val="0"/>
+          </a:schemeClr>
+        </a:solidFill>
+        <a:effectLst/>
+      </p:bgPr>
+    </p:bg>
+    <p:spTree>
+      <p:nvGrpSpPr>
+        <p:cNvPr id="1" name=""/>
+        <p:cNvGrpSpPr/>
+        <p:nvPr/>
+      </p:nvGrpSpPr>
+      <p:grpSpPr>
+        <a:xfrm>
+          <a:off x="0" y="0"/>
+          <a:ext cx="0" cy="0"/>
+          <a:chOff x="0" y="0"/>
+          <a:chExt cx="0" cy="0"/>
+        </a:xfrm>
+      </p:grpSpPr>
+      <p:sp>
+        <p:nvSpPr>
+          <p:cNvPr id="2" name="Rectangle: Rounded Corners 1">
+            <a:extLst>
+              <a:ext uri="{FF2B5EF4-FFF2-40B4-BE49-F238E27FC236}">
+                <a16:creationId xmlns:a16="http://schemas.microsoft.com/office/drawing/2014/main" id="{69501FBE-EF18-411C-BD19-7A748508DB14}"/>
+              </a:ext>
+            </a:extLst>
+          </p:cNvPr>
+          <p:cNvSpPr/>
+          <p:nvPr/>
+        </p:nvSpPr>
+        <p:spPr>
+          <a:xfrm>
+            <a:off x="1204623" y="1272209"/>
+            <a:ext cx="2353586" cy="425394"/>
+          </a:xfrm>
+          <a:prstGeom prst="roundRect">
+            <a:avLst/>
+          </a:prstGeom>
+          <a:solidFill>
+            <a:srgbClr val="0078D4"/>
+          </a:solidFill>
+          <a:ln>
+            <a:noFill/>
+          </a:ln>
+        </p:spPr>
+        <p:style>
+          <a:lnRef idx="2">
+            <a:schemeClr val="accent1">
+              <a:shade val="50000"/>
+            </a:schemeClr>
+          </a:lnRef>
+          <a:fillRef idx="1">
+            <a:schemeClr val="accent1"/>
+          </a:fillRef>
+          <a:effectRef idx="0">
+            <a:schemeClr val="accent1"/>
+          </a:effectRef>
+          <a:fontRef idx="minor">
+            <a:schemeClr val="lt1"/>
+          </a:fontRef>
+        </p:style>
+        <p:txBody>
+          <a:bodyPr rtlCol="0" anchor="ctr"/>
+          <a:lstStyle/>
+          <a:p>
+            <a:pPr algn="ctr"/>
+            <a:r>
+              <a:rPr lang="en-IE" dirty="0"/>
+              <a:t>      Deploy to Azure</a:t>
+            </a:r>
+          </a:p>
+        </p:txBody>
+      </p:sp>
+      <p:pic>
+        <p:nvPicPr>
+          <p:cNvPr id="3" name="Graphic 2">
+            <a:extLst>
+              <a:ext uri="{FF2B5EF4-FFF2-40B4-BE49-F238E27FC236}">
+                <a16:creationId xmlns:a16="http://schemas.microsoft.com/office/drawing/2014/main" id="{A0D2E980-A5C1-44B5-87F8-0F81C6249F98}"/>
+              </a:ext>
+            </a:extLst>
+          </p:cNvPr>
+          <p:cNvPicPr>
+            <a:picLocks noChangeAspect="1"/>
+          </p:cNvPicPr>
+          <p:nvPr/>
+        </p:nvPicPr>
+        <p:blipFill>
+          <a:blip r:embed="rId2">
+            <a:extLst>
+              <a:ext uri="{28A0092B-C50C-407E-A947-70E740481C1C}">
+                <a14:useLocalDpi xmlns:a14="http://schemas.microsoft.com/office/drawing/2010/main" val="0"/>
+              </a:ext>
+              <a:ext uri="{96DAC541-7B7A-43D3-8B79-37D633B846F1}">
+                <asvg:svgBlip xmlns:asvg="http://schemas.microsoft.com/office/drawing/2016/SVG/main" r:embed="rId3"/>
+              </a:ext>
+            </a:extLst>
+          </a:blip>
+          <a:stretch>
+            <a:fillRect/>
+          </a:stretch>
+        </p:blipFill>
+        <p:spPr>
+          <a:xfrm>
+            <a:off x="1351120" y="1307989"/>
+            <a:ext cx="353833" cy="353833"/>
+          </a:xfrm>
+          <a:prstGeom prst="rect">
+            <a:avLst/>
+          </a:prstGeom>
+        </p:spPr>
+      </p:pic>
+    </p:spTree>
+    <p:extLst>
+      <p:ext uri="{BB962C8B-B14F-4D97-AF65-F5344CB8AC3E}">
+        <p14:creationId xmlns:p14="http://schemas.microsoft.com/office/powerpoint/2010/main" val="3420479405"/>
+      </p:ext>
+    </p:extLst>
+  </p:cSld>
+  <p:clrMapOvr>
+    <a:masterClrMapping/>
+  </p:clrMapOvr>
+</p:sld>
+</file>
+
 <file path=ppt/theme/theme1.xml><?xml version="1.0" encoding="utf-8"?>
 <a:theme xmlns:a="http://schemas.openxmlformats.org/drawingml/2006/main" name="Office Theme">
   <a:themeElements>

</xml_diff>

<commit_message>
Addressing feedback received so far
</commit_message>
<xml_diff>
--- a/Hands-on lab/Images/image-source.pptx
+++ b/Hands-on lab/Images/image-source.pptx
@@ -262,7 +262,7 @@
           <a:p>
             <a:fld id="{9F1BFCDA-4DF7-4C82-AD84-C667DD7FA52D}" type="datetimeFigureOut">
               <a:rPr lang="en-IE" smtClean="0"/>
-              <a:t>24/07/2019</a:t>
+              <a:t>16/08/2019</a:t>
             </a:fld>
             <a:endParaRPr lang="en-IE"/>
           </a:p>
@@ -462,7 +462,7 @@
           <a:p>
             <a:fld id="{9F1BFCDA-4DF7-4C82-AD84-C667DD7FA52D}" type="datetimeFigureOut">
               <a:rPr lang="en-IE" smtClean="0"/>
-              <a:t>24/07/2019</a:t>
+              <a:t>16/08/2019</a:t>
             </a:fld>
             <a:endParaRPr lang="en-IE"/>
           </a:p>
@@ -672,7 +672,7 @@
           <a:p>
             <a:fld id="{9F1BFCDA-4DF7-4C82-AD84-C667DD7FA52D}" type="datetimeFigureOut">
               <a:rPr lang="en-IE" smtClean="0"/>
-              <a:t>24/07/2019</a:t>
+              <a:t>16/08/2019</a:t>
             </a:fld>
             <a:endParaRPr lang="en-IE"/>
           </a:p>
@@ -872,7 +872,7 @@
           <a:p>
             <a:fld id="{9F1BFCDA-4DF7-4C82-AD84-C667DD7FA52D}" type="datetimeFigureOut">
               <a:rPr lang="en-IE" smtClean="0"/>
-              <a:t>24/07/2019</a:t>
+              <a:t>16/08/2019</a:t>
             </a:fld>
             <a:endParaRPr lang="en-IE"/>
           </a:p>
@@ -1148,7 +1148,7 @@
           <a:p>
             <a:fld id="{9F1BFCDA-4DF7-4C82-AD84-C667DD7FA52D}" type="datetimeFigureOut">
               <a:rPr lang="en-IE" smtClean="0"/>
-              <a:t>24/07/2019</a:t>
+              <a:t>16/08/2019</a:t>
             </a:fld>
             <a:endParaRPr lang="en-IE"/>
           </a:p>
@@ -1416,7 +1416,7 @@
           <a:p>
             <a:fld id="{9F1BFCDA-4DF7-4C82-AD84-C667DD7FA52D}" type="datetimeFigureOut">
               <a:rPr lang="en-IE" smtClean="0"/>
-              <a:t>24/07/2019</a:t>
+              <a:t>16/08/2019</a:t>
             </a:fld>
             <a:endParaRPr lang="en-IE"/>
           </a:p>
@@ -1831,7 +1831,7 @@
           <a:p>
             <a:fld id="{9F1BFCDA-4DF7-4C82-AD84-C667DD7FA52D}" type="datetimeFigureOut">
               <a:rPr lang="en-IE" smtClean="0"/>
-              <a:t>24/07/2019</a:t>
+              <a:t>16/08/2019</a:t>
             </a:fld>
             <a:endParaRPr lang="en-IE"/>
           </a:p>
@@ -1973,7 +1973,7 @@
           <a:p>
             <a:fld id="{9F1BFCDA-4DF7-4C82-AD84-C667DD7FA52D}" type="datetimeFigureOut">
               <a:rPr lang="en-IE" smtClean="0"/>
-              <a:t>24/07/2019</a:t>
+              <a:t>16/08/2019</a:t>
             </a:fld>
             <a:endParaRPr lang="en-IE"/>
           </a:p>
@@ -2086,7 +2086,7 @@
           <a:p>
             <a:fld id="{9F1BFCDA-4DF7-4C82-AD84-C667DD7FA52D}" type="datetimeFigureOut">
               <a:rPr lang="en-IE" smtClean="0"/>
-              <a:t>24/07/2019</a:t>
+              <a:t>16/08/2019</a:t>
             </a:fld>
             <a:endParaRPr lang="en-IE"/>
           </a:p>
@@ -2399,7 +2399,7 @@
           <a:p>
             <a:fld id="{9F1BFCDA-4DF7-4C82-AD84-C667DD7FA52D}" type="datetimeFigureOut">
               <a:rPr lang="en-IE" smtClean="0"/>
-              <a:t>24/07/2019</a:t>
+              <a:t>16/08/2019</a:t>
             </a:fld>
             <a:endParaRPr lang="en-IE"/>
           </a:p>
@@ -2688,7 +2688,7 @@
           <a:p>
             <a:fld id="{9F1BFCDA-4DF7-4C82-AD84-C667DD7FA52D}" type="datetimeFigureOut">
               <a:rPr lang="en-IE" smtClean="0"/>
-              <a:t>24/07/2019</a:t>
+              <a:t>16/08/2019</a:t>
             </a:fld>
             <a:endParaRPr lang="en-IE"/>
           </a:p>
@@ -2931,7 +2931,7 @@
           <a:p>
             <a:fld id="{9F1BFCDA-4DF7-4C82-AD84-C667DD7FA52D}" type="datetimeFigureOut">
               <a:rPr lang="en-IE" smtClean="0"/>
-              <a:t>24/07/2019</a:t>
+              <a:t>16/08/2019</a:t>
             </a:fld>
             <a:endParaRPr lang="en-IE"/>
           </a:p>
@@ -4760,8 +4760,8 @@
         </p:nvSpPr>
         <p:spPr>
           <a:xfrm>
-            <a:off x="5476970" y="3098852"/>
-            <a:ext cx="1846479" cy="415498"/>
+            <a:off x="5300639" y="3206189"/>
+            <a:ext cx="2099109" cy="261610"/>
           </a:xfrm>
           <a:prstGeom prst="rect">
             <a:avLst/>
@@ -4781,18 +4781,7 @@
                   <a:schemeClr val="bg1"/>
                 </a:solidFill>
               </a:rPr>
-              <a:t>Azure Migrate</a:t>
-            </a:r>
-          </a:p>
-          <a:p>
-            <a:pPr algn="ctr"/>
-            <a:r>
-              <a:rPr lang="en-US" sz="1000" dirty="0">
-                <a:solidFill>
-                  <a:schemeClr val="bg1"/>
-                </a:solidFill>
-              </a:rPr>
-              <a:t>(Azure Site Recovery engine)</a:t>
+              <a:t>Azure Migrate: Server Migration</a:t>
             </a:r>
           </a:p>
         </p:txBody>
@@ -5323,10 +5312,10 @@
         </p:nvGrpSpPr>
         <p:grpSpPr>
           <a:xfrm>
-            <a:off x="5284265" y="792225"/>
-            <a:ext cx="2174057" cy="1039595"/>
-            <a:chOff x="5284266" y="792225"/>
-            <a:chExt cx="1641490" cy="1039595"/>
+            <a:off x="5228504" y="792225"/>
+            <a:ext cx="2211208" cy="1039595"/>
+            <a:chOff x="5242166" y="792225"/>
+            <a:chExt cx="1669540" cy="1039595"/>
           </a:xfrm>
         </p:grpSpPr>
         <p:sp>
@@ -5428,8 +5417,8 @@
           </p:nvSpPr>
           <p:spPr>
             <a:xfrm>
-              <a:off x="5284266" y="1220411"/>
-              <a:ext cx="1641490" cy="600164"/>
+              <a:off x="5242166" y="1225987"/>
+              <a:ext cx="1641490" cy="430887"/>
             </a:xfrm>
             <a:prstGeom prst="rect">
               <a:avLst/>
@@ -5449,7 +5438,7 @@
                     <a:schemeClr val="bg1"/>
                   </a:solidFill>
                 </a:rPr>
-                <a:t>Azure Migrate</a:t>
+                <a:t>Azure Migrate: Server Assessment</a:t>
               </a:r>
               <a:br>
                 <a:rPr lang="en-US" sz="1100" dirty="0">

</xml_diff>